<commit_message>
updates encryption and decryption command
</commit_message>
<xml_diff>
--- a/docs/diagrams/AddTheaterSequenceDiagram.pptx
+++ b/docs/diagrams/AddTheaterSequenceDiagram.pptx
@@ -138,6 +138,678 @@
       </pc:sldChg>
     </pc:docChg>
   </pc:docChgLst>
+  <pc:docChgLst>
+    <pc:chgData name="Chan Jun Yuan" userId="30ea8f8e1118c6fe" providerId="LiveId" clId="{47EA5731-E81D-41B8-9E49-F60237A91366}"/>
+    <pc:docChg chg="undo custSel modSld">
+      <pc:chgData name="Chan Jun Yuan" userId="30ea8f8e1118c6fe" providerId="LiveId" clId="{47EA5731-E81D-41B8-9E49-F60237A91366}" dt="2018-04-03T07:24:40.093" v="1404" actId="14100"/>
+      <pc:docMkLst>
+        <pc:docMk/>
+      </pc:docMkLst>
+      <pc:sldChg chg="addSp delSp modSp">
+        <pc:chgData name="Chan Jun Yuan" userId="30ea8f8e1118c6fe" providerId="LiveId" clId="{47EA5731-E81D-41B8-9E49-F60237A91366}" dt="2018-04-03T07:24:40.093" v="1404" actId="14100"/>
+        <pc:sldMkLst>
+          <pc:docMk/>
+          <pc:sldMk cId="3081708080" sldId="256"/>
+        </pc:sldMkLst>
+        <pc:spChg chg="add del mod">
+          <ac:chgData name="Chan Jun Yuan" userId="30ea8f8e1118c6fe" providerId="LiveId" clId="{47EA5731-E81D-41B8-9E49-F60237A91366}" dt="2018-04-03T07:22:34.985" v="1360" actId="14100"/>
+          <ac:spMkLst>
+            <pc:docMk/>
+            <pc:sldMk cId="3081708080" sldId="256"/>
+            <ac:spMk id="4" creationId="{3BF717D6-E0A1-4583-9A88-C1839947B7DA}"/>
+          </ac:spMkLst>
+        </pc:spChg>
+        <pc:spChg chg="mod">
+          <ac:chgData name="Chan Jun Yuan" userId="30ea8f8e1118c6fe" providerId="LiveId" clId="{47EA5731-E81D-41B8-9E49-F60237A91366}" dt="2018-04-03T07:17:20.485" v="1132" actId="1038"/>
+          <ac:spMkLst>
+            <pc:docMk/>
+            <pc:sldMk cId="3081708080" sldId="256"/>
+            <ac:spMk id="5" creationId="{257B1AA6-B5A6-481C-ABF7-C4A412216F84}"/>
+          </ac:spMkLst>
+        </pc:spChg>
+        <pc:spChg chg="mod">
+          <ac:chgData name="Chan Jun Yuan" userId="30ea8f8e1118c6fe" providerId="LiveId" clId="{47EA5731-E81D-41B8-9E49-F60237A91366}" dt="2018-04-03T07:23:46.361" v="1392" actId="14100"/>
+          <ac:spMkLst>
+            <pc:docMk/>
+            <pc:sldMk cId="3081708080" sldId="256"/>
+            <ac:spMk id="7" creationId="{5CAB6E9E-09A7-46D9-9BBC-F5CEE2DC3272}"/>
+          </ac:spMkLst>
+        </pc:spChg>
+        <pc:spChg chg="mod">
+          <ac:chgData name="Chan Jun Yuan" userId="30ea8f8e1118c6fe" providerId="LiveId" clId="{47EA5731-E81D-41B8-9E49-F60237A91366}" dt="2018-04-03T07:17:20.485" v="1132" actId="1038"/>
+          <ac:spMkLst>
+            <pc:docMk/>
+            <pc:sldMk cId="3081708080" sldId="256"/>
+            <ac:spMk id="8" creationId="{069F1B83-B200-4F68-AF76-9DED6D102C67}"/>
+          </ac:spMkLst>
+        </pc:spChg>
+        <pc:spChg chg="mod">
+          <ac:chgData name="Chan Jun Yuan" userId="30ea8f8e1118c6fe" providerId="LiveId" clId="{47EA5731-E81D-41B8-9E49-F60237A91366}" dt="2018-04-03T07:17:20.485" v="1132" actId="1038"/>
+          <ac:spMkLst>
+            <pc:docMk/>
+            <pc:sldMk cId="3081708080" sldId="256"/>
+            <ac:spMk id="10" creationId="{6AE5EF5B-10E2-4D4F-B317-BD620870594A}"/>
+          </ac:spMkLst>
+        </pc:spChg>
+        <pc:spChg chg="mod">
+          <ac:chgData name="Chan Jun Yuan" userId="30ea8f8e1118c6fe" providerId="LiveId" clId="{47EA5731-E81D-41B8-9E49-F60237A91366}" dt="2018-04-03T07:17:20.485" v="1132" actId="1038"/>
+          <ac:spMkLst>
+            <pc:docMk/>
+            <pc:sldMk cId="3081708080" sldId="256"/>
+            <ac:spMk id="11" creationId="{C30650E3-A4FA-4334-A32F-656A857A86EC}"/>
+          </ac:spMkLst>
+        </pc:spChg>
+        <pc:spChg chg="mod">
+          <ac:chgData name="Chan Jun Yuan" userId="30ea8f8e1118c6fe" providerId="LiveId" clId="{47EA5731-E81D-41B8-9E49-F60237A91366}" dt="2018-04-03T07:17:20.485" v="1132" actId="1038"/>
+          <ac:spMkLst>
+            <pc:docMk/>
+            <pc:sldMk cId="3081708080" sldId="256"/>
+            <ac:spMk id="13" creationId="{0FB361B1-904F-47A4-B6CC-9FAA40B0A377}"/>
+          </ac:spMkLst>
+        </pc:spChg>
+        <pc:spChg chg="mod">
+          <ac:chgData name="Chan Jun Yuan" userId="30ea8f8e1118c6fe" providerId="LiveId" clId="{47EA5731-E81D-41B8-9E49-F60237A91366}" dt="2018-04-03T07:17:20.485" v="1132" actId="1038"/>
+          <ac:spMkLst>
+            <pc:docMk/>
+            <pc:sldMk cId="3081708080" sldId="256"/>
+            <ac:spMk id="15" creationId="{E5AEA6D5-97D0-4E43-9BF2-C275C03924C5}"/>
+          </ac:spMkLst>
+        </pc:spChg>
+        <pc:spChg chg="mod">
+          <ac:chgData name="Chan Jun Yuan" userId="30ea8f8e1118c6fe" providerId="LiveId" clId="{47EA5731-E81D-41B8-9E49-F60237A91366}" dt="2018-04-03T07:24:03.678" v="1400" actId="1076"/>
+          <ac:spMkLst>
+            <pc:docMk/>
+            <pc:sldMk cId="3081708080" sldId="256"/>
+            <ac:spMk id="16" creationId="{AD65E742-73F7-4DC1-B92D-D93588AE0A60}"/>
+          </ac:spMkLst>
+        </pc:spChg>
+        <pc:spChg chg="mod">
+          <ac:chgData name="Chan Jun Yuan" userId="30ea8f8e1118c6fe" providerId="LiveId" clId="{47EA5731-E81D-41B8-9E49-F60237A91366}" dt="2018-04-03T07:17:20.485" v="1132" actId="1038"/>
+          <ac:spMkLst>
+            <pc:docMk/>
+            <pc:sldMk cId="3081708080" sldId="256"/>
+            <ac:spMk id="18" creationId="{BBC206B5-48C5-431B-9B76-77A87F9A0C72}"/>
+          </ac:spMkLst>
+        </pc:spChg>
+        <pc:spChg chg="mod">
+          <ac:chgData name="Chan Jun Yuan" userId="30ea8f8e1118c6fe" providerId="LiveId" clId="{47EA5731-E81D-41B8-9E49-F60237A91366}" dt="2018-04-03T07:17:20.485" v="1132" actId="1038"/>
+          <ac:spMkLst>
+            <pc:docMk/>
+            <pc:sldMk cId="3081708080" sldId="256"/>
+            <ac:spMk id="22" creationId="{A9E80E3D-4FCA-46CB-B0F3-3CFCA08D34E7}"/>
+          </ac:spMkLst>
+        </pc:spChg>
+        <pc:spChg chg="mod">
+          <ac:chgData name="Chan Jun Yuan" userId="30ea8f8e1118c6fe" providerId="LiveId" clId="{47EA5731-E81D-41B8-9E49-F60237A91366}" dt="2018-04-03T07:17:20.485" v="1132" actId="1038"/>
+          <ac:spMkLst>
+            <pc:docMk/>
+            <pc:sldMk cId="3081708080" sldId="256"/>
+            <ac:spMk id="26" creationId="{BC4BA459-3E3B-43C9-A54A-C4D842534C8E}"/>
+          </ac:spMkLst>
+        </pc:spChg>
+        <pc:spChg chg="mod">
+          <ac:chgData name="Chan Jun Yuan" userId="30ea8f8e1118c6fe" providerId="LiveId" clId="{47EA5731-E81D-41B8-9E49-F60237A91366}" dt="2018-04-03T07:17:20.485" v="1132" actId="1038"/>
+          <ac:spMkLst>
+            <pc:docMk/>
+            <pc:sldMk cId="3081708080" sldId="256"/>
+            <ac:spMk id="43" creationId="{2DEC9B14-D5D5-46DF-B480-09FB79E8D2F2}"/>
+          </ac:spMkLst>
+        </pc:spChg>
+        <pc:spChg chg="mod">
+          <ac:chgData name="Chan Jun Yuan" userId="30ea8f8e1118c6fe" providerId="LiveId" clId="{47EA5731-E81D-41B8-9E49-F60237A91366}" dt="2018-04-03T07:17:20.485" v="1132" actId="1038"/>
+          <ac:spMkLst>
+            <pc:docMk/>
+            <pc:sldMk cId="3081708080" sldId="256"/>
+            <ac:spMk id="45" creationId="{C4D7CA3B-8A4E-460C-B7A3-361B30B46DD9}"/>
+          </ac:spMkLst>
+        </pc:spChg>
+        <pc:spChg chg="add del">
+          <ac:chgData name="Chan Jun Yuan" userId="30ea8f8e1118c6fe" providerId="LiveId" clId="{47EA5731-E81D-41B8-9E49-F60237A91366}" dt="2018-04-03T06:36:24.093" v="5"/>
+          <ac:spMkLst>
+            <pc:docMk/>
+            <pc:sldMk cId="3081708080" sldId="256"/>
+            <ac:spMk id="48" creationId="{DDE4B3F7-E70E-4334-A265-F0CC2A176785}"/>
+          </ac:spMkLst>
+        </pc:spChg>
+        <pc:spChg chg="add mod">
+          <ac:chgData name="Chan Jun Yuan" userId="30ea8f8e1118c6fe" providerId="LiveId" clId="{47EA5731-E81D-41B8-9E49-F60237A91366}" dt="2018-04-03T07:17:20.485" v="1132" actId="1038"/>
+          <ac:spMkLst>
+            <pc:docMk/>
+            <pc:sldMk cId="3081708080" sldId="256"/>
+            <ac:spMk id="49" creationId="{BD86AB15-2BA6-4FC3-AEAE-5C9E3B27A9BC}"/>
+          </ac:spMkLst>
+        </pc:spChg>
+        <pc:spChg chg="del mod">
+          <ac:chgData name="Chan Jun Yuan" userId="30ea8f8e1118c6fe" providerId="LiveId" clId="{47EA5731-E81D-41B8-9E49-F60237A91366}" dt="2018-04-03T07:10:36.484" v="1001" actId="478"/>
+          <ac:spMkLst>
+            <pc:docMk/>
+            <pc:sldMk cId="3081708080" sldId="256"/>
+            <ac:spMk id="51" creationId="{DD94266B-D533-4679-B0FD-E826FEA96AEF}"/>
+          </ac:spMkLst>
+        </pc:spChg>
+        <pc:spChg chg="del mod">
+          <ac:chgData name="Chan Jun Yuan" userId="30ea8f8e1118c6fe" providerId="LiveId" clId="{47EA5731-E81D-41B8-9E49-F60237A91366}" dt="2018-04-03T07:10:42.707" v="1004" actId="478"/>
+          <ac:spMkLst>
+            <pc:docMk/>
+            <pc:sldMk cId="3081708080" sldId="256"/>
+            <ac:spMk id="53" creationId="{1BB45041-2D5E-488A-9FBF-B0F0F261A1A9}"/>
+          </ac:spMkLst>
+        </pc:spChg>
+        <pc:spChg chg="mod">
+          <ac:chgData name="Chan Jun Yuan" userId="30ea8f8e1118c6fe" providerId="LiveId" clId="{47EA5731-E81D-41B8-9E49-F60237A91366}" dt="2018-04-03T07:17:20.485" v="1132" actId="1038"/>
+          <ac:spMkLst>
+            <pc:docMk/>
+            <pc:sldMk cId="3081708080" sldId="256"/>
+            <ac:spMk id="55" creationId="{2E443D7A-4ED4-4D99-8922-6AD3BCF0CCF6}"/>
+          </ac:spMkLst>
+        </pc:spChg>
+        <pc:spChg chg="mod">
+          <ac:chgData name="Chan Jun Yuan" userId="30ea8f8e1118c6fe" providerId="LiveId" clId="{47EA5731-E81D-41B8-9E49-F60237A91366}" dt="2018-04-03T07:17:20.485" v="1132" actId="1038"/>
+          <ac:spMkLst>
+            <pc:docMk/>
+            <pc:sldMk cId="3081708080" sldId="256"/>
+            <ac:spMk id="57" creationId="{4039B2F3-4705-4A23-B4FF-B762DB0FF401}"/>
+          </ac:spMkLst>
+        </pc:spChg>
+        <pc:spChg chg="add mod">
+          <ac:chgData name="Chan Jun Yuan" userId="30ea8f8e1118c6fe" providerId="LiveId" clId="{47EA5731-E81D-41B8-9E49-F60237A91366}" dt="2018-04-03T07:17:20.485" v="1132" actId="1038"/>
+          <ac:spMkLst>
+            <pc:docMk/>
+            <pc:sldMk cId="3081708080" sldId="256"/>
+            <ac:spMk id="59" creationId="{68970A61-4DB6-49C7-8952-1AA20B3441B2}"/>
+          </ac:spMkLst>
+        </pc:spChg>
+        <pc:spChg chg="mod">
+          <ac:chgData name="Chan Jun Yuan" userId="30ea8f8e1118c6fe" providerId="LiveId" clId="{47EA5731-E81D-41B8-9E49-F60237A91366}" dt="2018-04-03T07:17:20.485" v="1132" actId="1038"/>
+          <ac:spMkLst>
+            <pc:docMk/>
+            <pc:sldMk cId="3081708080" sldId="256"/>
+            <ac:spMk id="60" creationId="{388664D5-7A3B-4D8A-B1B2-6658374B78D6}"/>
+          </ac:spMkLst>
+        </pc:spChg>
+        <pc:spChg chg="add del mod">
+          <ac:chgData name="Chan Jun Yuan" userId="30ea8f8e1118c6fe" providerId="LiveId" clId="{47EA5731-E81D-41B8-9E49-F60237A91366}" dt="2018-04-03T06:50:34.434" v="375" actId="478"/>
+          <ac:spMkLst>
+            <pc:docMk/>
+            <pc:sldMk cId="3081708080" sldId="256"/>
+            <ac:spMk id="64" creationId="{82A43905-19E8-4984-BA1E-4768C38ED6E4}"/>
+          </ac:spMkLst>
+        </pc:spChg>
+        <pc:spChg chg="mod">
+          <ac:chgData name="Chan Jun Yuan" userId="30ea8f8e1118c6fe" providerId="LiveId" clId="{47EA5731-E81D-41B8-9E49-F60237A91366}" dt="2018-04-03T07:17:20.485" v="1132" actId="1038"/>
+          <ac:spMkLst>
+            <pc:docMk/>
+            <pc:sldMk cId="3081708080" sldId="256"/>
+            <ac:spMk id="74" creationId="{195E00E5-6029-41FB-9E42-759158BB39E6}"/>
+          </ac:spMkLst>
+        </pc:spChg>
+        <pc:spChg chg="mod">
+          <ac:chgData name="Chan Jun Yuan" userId="30ea8f8e1118c6fe" providerId="LiveId" clId="{47EA5731-E81D-41B8-9E49-F60237A91366}" dt="2018-04-03T07:17:20.485" v="1132" actId="1038"/>
+          <ac:spMkLst>
+            <pc:docMk/>
+            <pc:sldMk cId="3081708080" sldId="256"/>
+            <ac:spMk id="75" creationId="{905ADEEF-71D5-4BC2-AF4B-41E95D0708F8}"/>
+          </ac:spMkLst>
+        </pc:spChg>
+        <pc:spChg chg="mod">
+          <ac:chgData name="Chan Jun Yuan" userId="30ea8f8e1118c6fe" providerId="LiveId" clId="{47EA5731-E81D-41B8-9E49-F60237A91366}" dt="2018-04-03T07:17:20.485" v="1132" actId="1038"/>
+          <ac:spMkLst>
+            <pc:docMk/>
+            <pc:sldMk cId="3081708080" sldId="256"/>
+            <ac:spMk id="84" creationId="{AA45F2ED-189C-4035-BA40-7B1260D59C50}"/>
+          </ac:spMkLst>
+        </pc:spChg>
+        <pc:spChg chg="mod">
+          <ac:chgData name="Chan Jun Yuan" userId="30ea8f8e1118c6fe" providerId="LiveId" clId="{47EA5731-E81D-41B8-9E49-F60237A91366}" dt="2018-04-03T07:17:20.485" v="1132" actId="1038"/>
+          <ac:spMkLst>
+            <pc:docMk/>
+            <pc:sldMk cId="3081708080" sldId="256"/>
+            <ac:spMk id="85" creationId="{B5D68205-2ABF-4CBF-ABDF-113F077A16AB}"/>
+          </ac:spMkLst>
+        </pc:spChg>
+        <pc:spChg chg="add mod">
+          <ac:chgData name="Chan Jun Yuan" userId="30ea8f8e1118c6fe" providerId="LiveId" clId="{47EA5731-E81D-41B8-9E49-F60237A91366}" dt="2018-04-03T06:57:07.838" v="538" actId="571"/>
+          <ac:spMkLst>
+            <pc:docMk/>
+            <pc:sldMk cId="3081708080" sldId="256"/>
+            <ac:spMk id="94" creationId="{DA9E51A4-2C0E-42EF-AC23-CEEB9807039C}"/>
+          </ac:spMkLst>
+        </pc:spChg>
+        <pc:spChg chg="mod">
+          <ac:chgData name="Chan Jun Yuan" userId="30ea8f8e1118c6fe" providerId="LiveId" clId="{47EA5731-E81D-41B8-9E49-F60237A91366}" dt="2018-04-03T07:17:20.485" v="1132" actId="1038"/>
+          <ac:spMkLst>
+            <pc:docMk/>
+            <pc:sldMk cId="3081708080" sldId="256"/>
+            <ac:spMk id="96" creationId="{3DA038E6-7CEF-429E-91A0-4F780680CE75}"/>
+          </ac:spMkLst>
+        </pc:spChg>
+        <pc:spChg chg="add mod">
+          <ac:chgData name="Chan Jun Yuan" userId="30ea8f8e1118c6fe" providerId="LiveId" clId="{47EA5731-E81D-41B8-9E49-F60237A91366}" dt="2018-04-03T06:57:07.838" v="538" actId="571"/>
+          <ac:spMkLst>
+            <pc:docMk/>
+            <pc:sldMk cId="3081708080" sldId="256"/>
+            <ac:spMk id="98" creationId="{B5A7E45F-5048-4F04-BF19-FB881425F82D}"/>
+          </ac:spMkLst>
+        </pc:spChg>
+        <pc:spChg chg="add mod">
+          <ac:chgData name="Chan Jun Yuan" userId="30ea8f8e1118c6fe" providerId="LiveId" clId="{47EA5731-E81D-41B8-9E49-F60237A91366}" dt="2018-04-03T06:57:07.838" v="538" actId="571"/>
+          <ac:spMkLst>
+            <pc:docMk/>
+            <pc:sldMk cId="3081708080" sldId="256"/>
+            <ac:spMk id="99" creationId="{1D61E696-2D08-4757-AE50-CB2034284099}"/>
+          </ac:spMkLst>
+        </pc:spChg>
+        <pc:spChg chg="add mod">
+          <ac:chgData name="Chan Jun Yuan" userId="30ea8f8e1118c6fe" providerId="LiveId" clId="{47EA5731-E81D-41B8-9E49-F60237A91366}" dt="2018-04-03T06:57:07.838" v="538" actId="571"/>
+          <ac:spMkLst>
+            <pc:docMk/>
+            <pc:sldMk cId="3081708080" sldId="256"/>
+            <ac:spMk id="100" creationId="{C5DC7BE4-C6B6-4EEF-854F-75AA7D075736}"/>
+          </ac:spMkLst>
+        </pc:spChg>
+        <pc:spChg chg="add mod">
+          <ac:chgData name="Chan Jun Yuan" userId="30ea8f8e1118c6fe" providerId="LiveId" clId="{47EA5731-E81D-41B8-9E49-F60237A91366}" dt="2018-04-03T07:17:20.485" v="1132" actId="1038"/>
+          <ac:spMkLst>
+            <pc:docMk/>
+            <pc:sldMk cId="3081708080" sldId="256"/>
+            <ac:spMk id="102" creationId="{7166E1D7-74AE-4AE4-8353-AF907949FDD5}"/>
+          </ac:spMkLst>
+        </pc:spChg>
+        <pc:spChg chg="add del mod">
+          <ac:chgData name="Chan Jun Yuan" userId="30ea8f8e1118c6fe" providerId="LiveId" clId="{47EA5731-E81D-41B8-9E49-F60237A91366}" dt="2018-04-03T07:17:02.876" v="1109" actId="478"/>
+          <ac:spMkLst>
+            <pc:docMk/>
+            <pc:sldMk cId="3081708080" sldId="256"/>
+            <ac:spMk id="106" creationId="{391CDCF5-44BC-40A4-9453-1566107859B0}"/>
+          </ac:spMkLst>
+        </pc:spChg>
+        <pc:spChg chg="add mod">
+          <ac:chgData name="Chan Jun Yuan" userId="30ea8f8e1118c6fe" providerId="LiveId" clId="{47EA5731-E81D-41B8-9E49-F60237A91366}" dt="2018-04-03T07:21:22.104" v="1319" actId="1037"/>
+          <ac:spMkLst>
+            <pc:docMk/>
+            <pc:sldMk cId="3081708080" sldId="256"/>
+            <ac:spMk id="110" creationId="{C5D222E7-17A8-4BC7-AA22-1083058FF590}"/>
+          </ac:spMkLst>
+        </pc:spChg>
+        <pc:spChg chg="add mod">
+          <ac:chgData name="Chan Jun Yuan" userId="30ea8f8e1118c6fe" providerId="LiveId" clId="{47EA5731-E81D-41B8-9E49-F60237A91366}" dt="2018-04-03T07:17:20.485" v="1132" actId="1038"/>
+          <ac:spMkLst>
+            <pc:docMk/>
+            <pc:sldMk cId="3081708080" sldId="256"/>
+            <ac:spMk id="111" creationId="{EBA2BB42-913D-47D5-9E0F-582D09A20646}"/>
+          </ac:spMkLst>
+        </pc:spChg>
+        <pc:spChg chg="add mod">
+          <ac:chgData name="Chan Jun Yuan" userId="30ea8f8e1118c6fe" providerId="LiveId" clId="{47EA5731-E81D-41B8-9E49-F60237A91366}" dt="2018-04-03T07:17:20.485" v="1132" actId="1038"/>
+          <ac:spMkLst>
+            <pc:docMk/>
+            <pc:sldMk cId="3081708080" sldId="256"/>
+            <ac:spMk id="113" creationId="{3E9B4045-E8F0-4217-8F9B-2C9AFF9CC06F}"/>
+          </ac:spMkLst>
+        </pc:spChg>
+        <pc:spChg chg="add mod">
+          <ac:chgData name="Chan Jun Yuan" userId="30ea8f8e1118c6fe" providerId="LiveId" clId="{47EA5731-E81D-41B8-9E49-F60237A91366}" dt="2018-04-03T07:19:25.599" v="1297" actId="1037"/>
+          <ac:spMkLst>
+            <pc:docMk/>
+            <pc:sldMk cId="3081708080" sldId="256"/>
+            <ac:spMk id="117" creationId="{16AF24CA-9189-417E-9E6D-4C66BD2DBF5C}"/>
+          </ac:spMkLst>
+        </pc:spChg>
+        <pc:spChg chg="add del mod">
+          <ac:chgData name="Chan Jun Yuan" userId="30ea8f8e1118c6fe" providerId="LiveId" clId="{47EA5731-E81D-41B8-9E49-F60237A91366}" dt="2018-04-03T07:16:06.186" v="1104" actId="478"/>
+          <ac:spMkLst>
+            <pc:docMk/>
+            <pc:sldMk cId="3081708080" sldId="256"/>
+            <ac:spMk id="118" creationId="{25A99EA8-C8CE-464B-A7F9-4B46EC3B8881}"/>
+          </ac:spMkLst>
+        </pc:spChg>
+        <pc:spChg chg="add mod">
+          <ac:chgData name="Chan Jun Yuan" userId="30ea8f8e1118c6fe" providerId="LiveId" clId="{47EA5731-E81D-41B8-9E49-F60237A91366}" dt="2018-04-03T07:18:28.105" v="1199" actId="1076"/>
+          <ac:spMkLst>
+            <pc:docMk/>
+            <pc:sldMk cId="3081708080" sldId="256"/>
+            <ac:spMk id="121" creationId="{38D74202-775C-4709-AC5A-A6546C880D83}"/>
+          </ac:spMkLst>
+        </pc:spChg>
+        <pc:spChg chg="add mod">
+          <ac:chgData name="Chan Jun Yuan" userId="30ea8f8e1118c6fe" providerId="LiveId" clId="{47EA5731-E81D-41B8-9E49-F60237A91366}" dt="2018-04-03T07:19:04.059" v="1245" actId="1076"/>
+          <ac:spMkLst>
+            <pc:docMk/>
+            <pc:sldMk cId="3081708080" sldId="256"/>
+            <ac:spMk id="123" creationId="{6B2FAF8A-0A93-41D2-B66F-E825698EE1FC}"/>
+          </ac:spMkLst>
+        </pc:spChg>
+        <pc:spChg chg="mod">
+          <ac:chgData name="Chan Jun Yuan" userId="30ea8f8e1118c6fe" providerId="LiveId" clId="{47EA5731-E81D-41B8-9E49-F60237A91366}" dt="2018-04-03T07:17:20.485" v="1132" actId="1038"/>
+          <ac:spMkLst>
+            <pc:docMk/>
+            <pc:sldMk cId="3081708080" sldId="256"/>
+            <ac:spMk id="139" creationId="{9AAC540A-DE02-4540-B7C9-9C9C83248251}"/>
+          </ac:spMkLst>
+        </pc:spChg>
+        <pc:spChg chg="mod">
+          <ac:chgData name="Chan Jun Yuan" userId="30ea8f8e1118c6fe" providerId="LiveId" clId="{47EA5731-E81D-41B8-9E49-F60237A91366}" dt="2018-04-03T07:17:20.485" v="1132" actId="1038"/>
+          <ac:spMkLst>
+            <pc:docMk/>
+            <pc:sldMk cId="3081708080" sldId="256"/>
+            <ac:spMk id="140" creationId="{8D43EF85-01BA-4FE2-8FDA-CAE84631D688}"/>
+          </ac:spMkLst>
+        </pc:spChg>
+        <pc:spChg chg="add mod">
+          <ac:chgData name="Chan Jun Yuan" userId="30ea8f8e1118c6fe" providerId="LiveId" clId="{47EA5731-E81D-41B8-9E49-F60237A91366}" dt="2018-04-03T07:22:25.600" v="1357" actId="1076"/>
+          <ac:spMkLst>
+            <pc:docMk/>
+            <pc:sldMk cId="3081708080" sldId="256"/>
+            <ac:spMk id="141" creationId="{8C91B7F5-8A58-4D83-80DD-668E8A126C34}"/>
+          </ac:spMkLst>
+        </pc:spChg>
+        <pc:spChg chg="add mod">
+          <ac:chgData name="Chan Jun Yuan" userId="30ea8f8e1118c6fe" providerId="LiveId" clId="{47EA5731-E81D-41B8-9E49-F60237A91366}" dt="2018-04-03T07:22:47.397" v="1367" actId="1036"/>
+          <ac:spMkLst>
+            <pc:docMk/>
+            <pc:sldMk cId="3081708080" sldId="256"/>
+            <ac:spMk id="142" creationId="{B586E416-EE6E-4E8F-BB00-197F10C77087}"/>
+          </ac:spMkLst>
+        </pc:spChg>
+        <pc:spChg chg="add mod">
+          <ac:chgData name="Chan Jun Yuan" userId="30ea8f8e1118c6fe" providerId="LiveId" clId="{47EA5731-E81D-41B8-9E49-F60237A91366}" dt="2018-04-03T07:24:17.654" v="1402" actId="1076"/>
+          <ac:spMkLst>
+            <pc:docMk/>
+            <pc:sldMk cId="3081708080" sldId="256"/>
+            <ac:spMk id="151" creationId="{B36F10C7-590B-4B00-B174-596E8CB0489A}"/>
+          </ac:spMkLst>
+        </pc:spChg>
+        <pc:picChg chg="add mod">
+          <ac:chgData name="Chan Jun Yuan" userId="30ea8f8e1118c6fe" providerId="LiveId" clId="{47EA5731-E81D-41B8-9E49-F60237A91366}" dt="2018-04-03T07:17:20.485" v="1132" actId="1038"/>
+          <ac:picMkLst>
+            <pc:docMk/>
+            <pc:sldMk cId="3081708080" sldId="256"/>
+            <ac:picMk id="79" creationId="{ECB334F2-0182-4A03-887E-1D898983D35C}"/>
+          </ac:picMkLst>
+        </pc:picChg>
+        <pc:cxnChg chg="mod">
+          <ac:chgData name="Chan Jun Yuan" userId="30ea8f8e1118c6fe" providerId="LiveId" clId="{47EA5731-E81D-41B8-9E49-F60237A91366}" dt="2018-04-03T07:24:40.093" v="1404" actId="14100"/>
+          <ac:cxnSpMkLst>
+            <pc:docMk/>
+            <pc:sldMk cId="3081708080" sldId="256"/>
+            <ac:cxnSpMk id="6" creationId="{DFCD8705-A21A-4DFD-ADE5-6EE6475DBCF3}"/>
+          </ac:cxnSpMkLst>
+        </pc:cxnChg>
+        <pc:cxnChg chg="mod">
+          <ac:chgData name="Chan Jun Yuan" userId="30ea8f8e1118c6fe" providerId="LiveId" clId="{47EA5731-E81D-41B8-9E49-F60237A91366}" dt="2018-04-03T07:17:20.485" v="1132" actId="1038"/>
+          <ac:cxnSpMkLst>
+            <pc:docMk/>
+            <pc:sldMk cId="3081708080" sldId="256"/>
+            <ac:cxnSpMk id="9" creationId="{EDA9C723-855C-488B-9E68-B803845CCE6D}"/>
+          </ac:cxnSpMkLst>
+        </pc:cxnChg>
+        <pc:cxnChg chg="mod">
+          <ac:chgData name="Chan Jun Yuan" userId="30ea8f8e1118c6fe" providerId="LiveId" clId="{47EA5731-E81D-41B8-9E49-F60237A91366}" dt="2018-04-03T07:17:20.485" v="1132" actId="1038"/>
+          <ac:cxnSpMkLst>
+            <pc:docMk/>
+            <pc:sldMk cId="3081708080" sldId="256"/>
+            <ac:cxnSpMk id="12" creationId="{7F179CBE-D3C0-439C-B73B-E540C97C433B}"/>
+          </ac:cxnSpMkLst>
+        </pc:cxnChg>
+        <pc:cxnChg chg="mod">
+          <ac:chgData name="Chan Jun Yuan" userId="30ea8f8e1118c6fe" providerId="LiveId" clId="{47EA5731-E81D-41B8-9E49-F60237A91366}" dt="2018-04-03T07:23:57.264" v="1393" actId="1076"/>
+          <ac:cxnSpMkLst>
+            <pc:docMk/>
+            <pc:sldMk cId="3081708080" sldId="256"/>
+            <ac:cxnSpMk id="14" creationId="{B951017A-C893-4A9B-841A-F5DA9670CA2B}"/>
+          </ac:cxnSpMkLst>
+        </pc:cxnChg>
+        <pc:cxnChg chg="mod">
+          <ac:chgData name="Chan Jun Yuan" userId="30ea8f8e1118c6fe" providerId="LiveId" clId="{47EA5731-E81D-41B8-9E49-F60237A91366}" dt="2018-04-03T07:17:20.485" v="1132" actId="1038"/>
+          <ac:cxnSpMkLst>
+            <pc:docMk/>
+            <pc:sldMk cId="3081708080" sldId="256"/>
+            <ac:cxnSpMk id="17" creationId="{A15A03C3-E988-493E-B334-CB5459FEB860}"/>
+          </ac:cxnSpMkLst>
+        </pc:cxnChg>
+        <pc:cxnChg chg="mod">
+          <ac:chgData name="Chan Jun Yuan" userId="30ea8f8e1118c6fe" providerId="LiveId" clId="{47EA5731-E81D-41B8-9E49-F60237A91366}" dt="2018-04-03T07:17:20.485" v="1132" actId="1038"/>
+          <ac:cxnSpMkLst>
+            <pc:docMk/>
+            <pc:sldMk cId="3081708080" sldId="256"/>
+            <ac:cxnSpMk id="23" creationId="{1FC8454A-B78F-42ED-9341-D74E642CA664}"/>
+          </ac:cxnSpMkLst>
+        </pc:cxnChg>
+        <pc:cxnChg chg="mod">
+          <ac:chgData name="Chan Jun Yuan" userId="30ea8f8e1118c6fe" providerId="LiveId" clId="{47EA5731-E81D-41B8-9E49-F60237A91366}" dt="2018-04-03T07:17:20.485" v="1132" actId="1038"/>
+          <ac:cxnSpMkLst>
+            <pc:docMk/>
+            <pc:sldMk cId="3081708080" sldId="256"/>
+            <ac:cxnSpMk id="25" creationId="{BB7B4BC3-71A3-4392-B529-B9A34F3778A4}"/>
+          </ac:cxnSpMkLst>
+        </pc:cxnChg>
+        <pc:cxnChg chg="mod">
+          <ac:chgData name="Chan Jun Yuan" userId="30ea8f8e1118c6fe" providerId="LiveId" clId="{47EA5731-E81D-41B8-9E49-F60237A91366}" dt="2018-04-03T07:17:20.485" v="1132" actId="1038"/>
+          <ac:cxnSpMkLst>
+            <pc:docMk/>
+            <pc:sldMk cId="3081708080" sldId="256"/>
+            <ac:cxnSpMk id="44" creationId="{9E03F4BF-2E0D-4F29-BA67-766D8A053AD6}"/>
+          </ac:cxnSpMkLst>
+        </pc:cxnChg>
+        <pc:cxnChg chg="mod">
+          <ac:chgData name="Chan Jun Yuan" userId="30ea8f8e1118c6fe" providerId="LiveId" clId="{47EA5731-E81D-41B8-9E49-F60237A91366}" dt="2018-04-03T07:17:20.485" v="1132" actId="1038"/>
+          <ac:cxnSpMkLst>
+            <pc:docMk/>
+            <pc:sldMk cId="3081708080" sldId="256"/>
+            <ac:cxnSpMk id="46" creationId="{EEF844EE-BAD2-4716-82A6-FC3AF2CFC53F}"/>
+          </ac:cxnSpMkLst>
+        </pc:cxnChg>
+        <pc:cxnChg chg="mod">
+          <ac:chgData name="Chan Jun Yuan" userId="30ea8f8e1118c6fe" providerId="LiveId" clId="{47EA5731-E81D-41B8-9E49-F60237A91366}" dt="2018-04-03T07:17:20.485" v="1132" actId="1038"/>
+          <ac:cxnSpMkLst>
+            <pc:docMk/>
+            <pc:sldMk cId="3081708080" sldId="256"/>
+            <ac:cxnSpMk id="50" creationId="{B205AAF9-D9A6-4E1A-8EBA-66CB08AD9CB2}"/>
+          </ac:cxnSpMkLst>
+        </pc:cxnChg>
+        <pc:cxnChg chg="mod">
+          <ac:chgData name="Chan Jun Yuan" userId="30ea8f8e1118c6fe" providerId="LiveId" clId="{47EA5731-E81D-41B8-9E49-F60237A91366}" dt="2018-04-03T07:17:20.485" v="1132" actId="1038"/>
+          <ac:cxnSpMkLst>
+            <pc:docMk/>
+            <pc:sldMk cId="3081708080" sldId="256"/>
+            <ac:cxnSpMk id="52" creationId="{3D1911C6-3EAD-4375-BC4E-848CA75ACDE2}"/>
+          </ac:cxnSpMkLst>
+        </pc:cxnChg>
+        <pc:cxnChg chg="mod">
+          <ac:chgData name="Chan Jun Yuan" userId="30ea8f8e1118c6fe" providerId="LiveId" clId="{47EA5731-E81D-41B8-9E49-F60237A91366}" dt="2018-04-03T07:17:20.485" v="1132" actId="1038"/>
+          <ac:cxnSpMkLst>
+            <pc:docMk/>
+            <pc:sldMk cId="3081708080" sldId="256"/>
+            <ac:cxnSpMk id="54" creationId="{19DA6CFA-1F0F-42FE-B9AC-6569474BDAFD}"/>
+          </ac:cxnSpMkLst>
+        </pc:cxnChg>
+        <pc:cxnChg chg="mod">
+          <ac:chgData name="Chan Jun Yuan" userId="30ea8f8e1118c6fe" providerId="LiveId" clId="{47EA5731-E81D-41B8-9E49-F60237A91366}" dt="2018-04-03T07:17:20.485" v="1132" actId="1038"/>
+          <ac:cxnSpMkLst>
+            <pc:docMk/>
+            <pc:sldMk cId="3081708080" sldId="256"/>
+            <ac:cxnSpMk id="56" creationId="{F1F468B3-C926-4525-9532-2DCBF65CB921}"/>
+          </ac:cxnSpMkLst>
+        </pc:cxnChg>
+        <pc:cxnChg chg="mod">
+          <ac:chgData name="Chan Jun Yuan" userId="30ea8f8e1118c6fe" providerId="LiveId" clId="{47EA5731-E81D-41B8-9E49-F60237A91366}" dt="2018-04-03T07:17:20.485" v="1132" actId="1038"/>
+          <ac:cxnSpMkLst>
+            <pc:docMk/>
+            <pc:sldMk cId="3081708080" sldId="256"/>
+            <ac:cxnSpMk id="58" creationId="{94D01E4C-E679-4304-8A72-C2BA88B800F6}"/>
+          </ac:cxnSpMkLst>
+        </pc:cxnChg>
+        <pc:cxnChg chg="mod">
+          <ac:chgData name="Chan Jun Yuan" userId="30ea8f8e1118c6fe" providerId="LiveId" clId="{47EA5731-E81D-41B8-9E49-F60237A91366}" dt="2018-04-03T07:17:20.485" v="1132" actId="1038"/>
+          <ac:cxnSpMkLst>
+            <pc:docMk/>
+            <pc:sldMk cId="3081708080" sldId="256"/>
+            <ac:cxnSpMk id="61" creationId="{E341C340-719D-4E7B-AAE7-21E6F471AB27}"/>
+          </ac:cxnSpMkLst>
+        </pc:cxnChg>
+        <pc:cxnChg chg="add del mod">
+          <ac:chgData name="Chan Jun Yuan" userId="30ea8f8e1118c6fe" providerId="LiveId" clId="{47EA5731-E81D-41B8-9E49-F60237A91366}" dt="2018-04-03T06:51:33.855" v="394" actId="478"/>
+          <ac:cxnSpMkLst>
+            <pc:docMk/>
+            <pc:sldMk cId="3081708080" sldId="256"/>
+            <ac:cxnSpMk id="66" creationId="{90052EA9-61C0-488F-9E68-C8755689A079}"/>
+          </ac:cxnSpMkLst>
+        </pc:cxnChg>
+        <pc:cxnChg chg="add mod">
+          <ac:chgData name="Chan Jun Yuan" userId="30ea8f8e1118c6fe" providerId="LiveId" clId="{47EA5731-E81D-41B8-9E49-F60237A91366}" dt="2018-04-03T07:17:20.485" v="1132" actId="1038"/>
+          <ac:cxnSpMkLst>
+            <pc:docMk/>
+            <pc:sldMk cId="3081708080" sldId="256"/>
+            <ac:cxnSpMk id="68" creationId="{8D8E7528-4D67-4443-950B-6D760AF2CA1D}"/>
+          </ac:cxnSpMkLst>
+        </pc:cxnChg>
+        <pc:cxnChg chg="add del mod">
+          <ac:chgData name="Chan Jun Yuan" userId="30ea8f8e1118c6fe" providerId="LiveId" clId="{47EA5731-E81D-41B8-9E49-F60237A91366}" dt="2018-04-03T06:51:51.686" v="396" actId="478"/>
+          <ac:cxnSpMkLst>
+            <pc:docMk/>
+            <pc:sldMk cId="3081708080" sldId="256"/>
+            <ac:cxnSpMk id="80" creationId="{AAA0394F-96A8-4DEA-AA48-7EE7BEA0F525}"/>
+          </ac:cxnSpMkLst>
+        </pc:cxnChg>
+        <pc:cxnChg chg="mod">
+          <ac:chgData name="Chan Jun Yuan" userId="30ea8f8e1118c6fe" providerId="LiveId" clId="{47EA5731-E81D-41B8-9E49-F60237A91366}" dt="2018-04-03T07:17:20.485" v="1132" actId="1038"/>
+          <ac:cxnSpMkLst>
+            <pc:docMk/>
+            <pc:sldMk cId="3081708080" sldId="256"/>
+            <ac:cxnSpMk id="83" creationId="{4A186F8E-335A-4596-89DD-C6E405C2FC55}"/>
+          </ac:cxnSpMkLst>
+        </pc:cxnChg>
+        <pc:cxnChg chg="add del mod">
+          <ac:chgData name="Chan Jun Yuan" userId="30ea8f8e1118c6fe" providerId="LiveId" clId="{47EA5731-E81D-41B8-9E49-F60237A91366}" dt="2018-04-03T06:51:51.686" v="396" actId="478"/>
+          <ac:cxnSpMkLst>
+            <pc:docMk/>
+            <pc:sldMk cId="3081708080" sldId="256"/>
+            <ac:cxnSpMk id="87" creationId="{51560180-6992-4A84-9B1F-88C629690855}"/>
+          </ac:cxnSpMkLst>
+        </pc:cxnChg>
+        <pc:cxnChg chg="mod">
+          <ac:chgData name="Chan Jun Yuan" userId="30ea8f8e1118c6fe" providerId="LiveId" clId="{47EA5731-E81D-41B8-9E49-F60237A91366}" dt="2018-04-03T07:17:20.485" v="1132" actId="1038"/>
+          <ac:cxnSpMkLst>
+            <pc:docMk/>
+            <pc:sldMk cId="3081708080" sldId="256"/>
+            <ac:cxnSpMk id="95" creationId="{1D76B350-FAC4-4356-821B-E211463AD7FA}"/>
+          </ac:cxnSpMkLst>
+        </pc:cxnChg>
+        <pc:cxnChg chg="add mod">
+          <ac:chgData name="Chan Jun Yuan" userId="30ea8f8e1118c6fe" providerId="LiveId" clId="{47EA5731-E81D-41B8-9E49-F60237A91366}" dt="2018-04-03T06:57:07.838" v="538" actId="571"/>
+          <ac:cxnSpMkLst>
+            <pc:docMk/>
+            <pc:sldMk cId="3081708080" sldId="256"/>
+            <ac:cxnSpMk id="97" creationId="{AED329DD-3E4B-4FC9-98C0-D61D65582DD0}"/>
+          </ac:cxnSpMkLst>
+        </pc:cxnChg>
+        <pc:cxnChg chg="add mod">
+          <ac:chgData name="Chan Jun Yuan" userId="30ea8f8e1118c6fe" providerId="LiveId" clId="{47EA5731-E81D-41B8-9E49-F60237A91366}" dt="2018-04-03T07:17:20.485" v="1132" actId="1038"/>
+          <ac:cxnSpMkLst>
+            <pc:docMk/>
+            <pc:sldMk cId="3081708080" sldId="256"/>
+            <ac:cxnSpMk id="105" creationId="{AAF9DE7B-E32C-4E9E-BE74-D3FDBFC45FFA}"/>
+          </ac:cxnSpMkLst>
+        </pc:cxnChg>
+        <pc:cxnChg chg="add del">
+          <ac:chgData name="Chan Jun Yuan" userId="30ea8f8e1118c6fe" providerId="LiveId" clId="{47EA5731-E81D-41B8-9E49-F60237A91366}" dt="2018-04-03T07:01:29.483" v="890"/>
+          <ac:cxnSpMkLst>
+            <pc:docMk/>
+            <pc:sldMk cId="3081708080" sldId="256"/>
+            <ac:cxnSpMk id="108" creationId="{FC6B1ECA-4E67-4F8B-9448-F89F7FE0D698}"/>
+          </ac:cxnSpMkLst>
+        </pc:cxnChg>
+        <pc:cxnChg chg="mod">
+          <ac:chgData name="Chan Jun Yuan" userId="30ea8f8e1118c6fe" providerId="LiveId" clId="{47EA5731-E81D-41B8-9E49-F60237A91366}" dt="2018-04-03T07:17:20.485" v="1132" actId="1038"/>
+          <ac:cxnSpMkLst>
+            <pc:docMk/>
+            <pc:sldMk cId="3081708080" sldId="256"/>
+            <ac:cxnSpMk id="109" creationId="{BCC6A046-A63A-4A08-89A6-E8A1392E09BB}"/>
+          </ac:cxnSpMkLst>
+        </pc:cxnChg>
+        <pc:cxnChg chg="add mod">
+          <ac:chgData name="Chan Jun Yuan" userId="30ea8f8e1118c6fe" providerId="LiveId" clId="{47EA5731-E81D-41B8-9E49-F60237A91366}" dt="2018-04-03T07:17:20.485" v="1132" actId="1038"/>
+          <ac:cxnSpMkLst>
+            <pc:docMk/>
+            <pc:sldMk cId="3081708080" sldId="256"/>
+            <ac:cxnSpMk id="112" creationId="{AEFD51E4-A910-47A6-B718-4FD241D93469}"/>
+          </ac:cxnSpMkLst>
+        </pc:cxnChg>
+        <pc:cxnChg chg="mod">
+          <ac:chgData name="Chan Jun Yuan" userId="30ea8f8e1118c6fe" providerId="LiveId" clId="{47EA5731-E81D-41B8-9E49-F60237A91366}" dt="2018-04-03T07:21:35.719" v="1321" actId="14100"/>
+          <ac:cxnSpMkLst>
+            <pc:docMk/>
+            <pc:sldMk cId="3081708080" sldId="256"/>
+            <ac:cxnSpMk id="114" creationId="{93A2F898-572C-4CFE-B1B2-2499C8B09022}"/>
+          </ac:cxnSpMkLst>
+        </pc:cxnChg>
+        <pc:cxnChg chg="mod">
+          <ac:chgData name="Chan Jun Yuan" userId="30ea8f8e1118c6fe" providerId="LiveId" clId="{47EA5731-E81D-41B8-9E49-F60237A91366}" dt="2018-04-03T07:17:20.485" v="1132" actId="1038"/>
+          <ac:cxnSpMkLst>
+            <pc:docMk/>
+            <pc:sldMk cId="3081708080" sldId="256"/>
+            <ac:cxnSpMk id="115" creationId="{A5910ED8-29F3-474E-8DA2-7A0389F2A4D7}"/>
+          </ac:cxnSpMkLst>
+        </pc:cxnChg>
+        <pc:cxnChg chg="add mod">
+          <ac:chgData name="Chan Jun Yuan" userId="30ea8f8e1118c6fe" providerId="LiveId" clId="{47EA5731-E81D-41B8-9E49-F60237A91366}" dt="2018-04-03T07:20:57.503" v="1307" actId="14100"/>
+          <ac:cxnSpMkLst>
+            <pc:docMk/>
+            <pc:sldMk cId="3081708080" sldId="256"/>
+            <ac:cxnSpMk id="116" creationId="{9F9DC763-5E18-4F1C-8D97-E266E1241347}"/>
+          </ac:cxnSpMkLst>
+        </pc:cxnChg>
+        <pc:cxnChg chg="add del mod">
+          <ac:chgData name="Chan Jun Yuan" userId="30ea8f8e1118c6fe" providerId="LiveId" clId="{47EA5731-E81D-41B8-9E49-F60237A91366}" dt="2018-04-03T07:17:40.184" v="1137" actId="478"/>
+          <ac:cxnSpMkLst>
+            <pc:docMk/>
+            <pc:sldMk cId="3081708080" sldId="256"/>
+            <ac:cxnSpMk id="120" creationId="{C40A9EB4-3341-4B51-A3C1-8D5D490392D0}"/>
+          </ac:cxnSpMkLst>
+        </pc:cxnChg>
+        <pc:cxnChg chg="add mod">
+          <ac:chgData name="Chan Jun Yuan" userId="30ea8f8e1118c6fe" providerId="LiveId" clId="{47EA5731-E81D-41B8-9E49-F60237A91366}" dt="2018-04-03T07:18:29.809" v="1203" actId="1038"/>
+          <ac:cxnSpMkLst>
+            <pc:docMk/>
+            <pc:sldMk cId="3081708080" sldId="256"/>
+            <ac:cxnSpMk id="122" creationId="{1C363E33-79CD-4F87-8CDF-2FD83182D400}"/>
+          </ac:cxnSpMkLst>
+        </pc:cxnChg>
+        <pc:cxnChg chg="add mod">
+          <ac:chgData name="Chan Jun Yuan" userId="30ea8f8e1118c6fe" providerId="LiveId" clId="{47EA5731-E81D-41B8-9E49-F60237A91366}" dt="2018-04-03T07:20:01.767" v="1304" actId="1035"/>
+          <ac:cxnSpMkLst>
+            <pc:docMk/>
+            <pc:sldMk cId="3081708080" sldId="256"/>
+            <ac:cxnSpMk id="130" creationId="{E304CE50-9C18-438C-9354-3BA253BC7BA0}"/>
+          </ac:cxnSpMkLst>
+        </pc:cxnChg>
+        <pc:cxnChg chg="add mod">
+          <ac:chgData name="Chan Jun Yuan" userId="30ea8f8e1118c6fe" providerId="LiveId" clId="{47EA5731-E81D-41B8-9E49-F60237A91366}" dt="2018-04-03T07:22:51.813" v="1368" actId="14100"/>
+          <ac:cxnSpMkLst>
+            <pc:docMk/>
+            <pc:sldMk cId="3081708080" sldId="256"/>
+            <ac:cxnSpMk id="138" creationId="{6F175AD1-8796-4A4B-AF88-68843E20994C}"/>
+          </ac:cxnSpMkLst>
+        </pc:cxnChg>
+        <pc:cxnChg chg="add mod">
+          <ac:chgData name="Chan Jun Yuan" userId="30ea8f8e1118c6fe" providerId="LiveId" clId="{47EA5731-E81D-41B8-9E49-F60237A91366}" dt="2018-04-03T07:23:26.508" v="1388" actId="14100"/>
+          <ac:cxnSpMkLst>
+            <pc:docMk/>
+            <pc:sldMk cId="3081708080" sldId="256"/>
+            <ac:cxnSpMk id="144" creationId="{BDA80BDD-6559-46F1-ACBE-0A59A712E3DD}"/>
+          </ac:cxnSpMkLst>
+        </pc:cxnChg>
+        <pc:cxnChg chg="add mod">
+          <ac:chgData name="Chan Jun Yuan" userId="30ea8f8e1118c6fe" providerId="LiveId" clId="{47EA5731-E81D-41B8-9E49-F60237A91366}" dt="2018-04-03T07:23:40.709" v="1391" actId="14100"/>
+          <ac:cxnSpMkLst>
+            <pc:docMk/>
+            <pc:sldMk cId="3081708080" sldId="256"/>
+            <ac:cxnSpMk id="149" creationId="{838F6211-8620-4E54-AAFD-A0EAF8A6C2DC}"/>
+          </ac:cxnSpMkLst>
+        </pc:cxnChg>
+      </pc:sldChg>
+    </pc:docChg>
+  </pc:docChgLst>
 </pc:chgInfo>
 </file>
 
@@ -290,7 +962,7 @@
           <a:p>
             <a:fld id="{0DE02EAB-1EF7-43EE-8E62-1A307D75968C}" type="datetimeFigureOut">
               <a:rPr lang="en-SG" smtClean="0"/>
-              <a:t>25/3/2018</a:t>
+              <a:t>3/4/2018</a:t>
             </a:fld>
             <a:endParaRPr lang="en-SG"/>
           </a:p>
@@ -490,7 +1162,7 @@
           <a:p>
             <a:fld id="{0DE02EAB-1EF7-43EE-8E62-1A307D75968C}" type="datetimeFigureOut">
               <a:rPr lang="en-SG" smtClean="0"/>
-              <a:t>25/3/2018</a:t>
+              <a:t>3/4/2018</a:t>
             </a:fld>
             <a:endParaRPr lang="en-SG"/>
           </a:p>
@@ -700,7 +1372,7 @@
           <a:p>
             <a:fld id="{0DE02EAB-1EF7-43EE-8E62-1A307D75968C}" type="datetimeFigureOut">
               <a:rPr lang="en-SG" smtClean="0"/>
-              <a:t>25/3/2018</a:t>
+              <a:t>3/4/2018</a:t>
             </a:fld>
             <a:endParaRPr lang="en-SG"/>
           </a:p>
@@ -900,7 +1572,7 @@
           <a:p>
             <a:fld id="{0DE02EAB-1EF7-43EE-8E62-1A307D75968C}" type="datetimeFigureOut">
               <a:rPr lang="en-SG" smtClean="0"/>
-              <a:t>25/3/2018</a:t>
+              <a:t>3/4/2018</a:t>
             </a:fld>
             <a:endParaRPr lang="en-SG"/>
           </a:p>
@@ -1176,7 +1848,7 @@
           <a:p>
             <a:fld id="{0DE02EAB-1EF7-43EE-8E62-1A307D75968C}" type="datetimeFigureOut">
               <a:rPr lang="en-SG" smtClean="0"/>
-              <a:t>25/3/2018</a:t>
+              <a:t>3/4/2018</a:t>
             </a:fld>
             <a:endParaRPr lang="en-SG"/>
           </a:p>
@@ -1444,7 +2116,7 @@
           <a:p>
             <a:fld id="{0DE02EAB-1EF7-43EE-8E62-1A307D75968C}" type="datetimeFigureOut">
               <a:rPr lang="en-SG" smtClean="0"/>
-              <a:t>25/3/2018</a:t>
+              <a:t>3/4/2018</a:t>
             </a:fld>
             <a:endParaRPr lang="en-SG"/>
           </a:p>
@@ -1859,7 +2531,7 @@
           <a:p>
             <a:fld id="{0DE02EAB-1EF7-43EE-8E62-1A307D75968C}" type="datetimeFigureOut">
               <a:rPr lang="en-SG" smtClean="0"/>
-              <a:t>25/3/2018</a:t>
+              <a:t>3/4/2018</a:t>
             </a:fld>
             <a:endParaRPr lang="en-SG"/>
           </a:p>
@@ -2001,7 +2673,7 @@
           <a:p>
             <a:fld id="{0DE02EAB-1EF7-43EE-8E62-1A307D75968C}" type="datetimeFigureOut">
               <a:rPr lang="en-SG" smtClean="0"/>
-              <a:t>25/3/2018</a:t>
+              <a:t>3/4/2018</a:t>
             </a:fld>
             <a:endParaRPr lang="en-SG"/>
           </a:p>
@@ -2114,7 +2786,7 @@
           <a:p>
             <a:fld id="{0DE02EAB-1EF7-43EE-8E62-1A307D75968C}" type="datetimeFigureOut">
               <a:rPr lang="en-SG" smtClean="0"/>
-              <a:t>25/3/2018</a:t>
+              <a:t>3/4/2018</a:t>
             </a:fld>
             <a:endParaRPr lang="en-SG"/>
           </a:p>
@@ -2427,7 +3099,7 @@
           <a:p>
             <a:fld id="{0DE02EAB-1EF7-43EE-8E62-1A307D75968C}" type="datetimeFigureOut">
               <a:rPr lang="en-SG" smtClean="0"/>
-              <a:t>25/3/2018</a:t>
+              <a:t>3/4/2018</a:t>
             </a:fld>
             <a:endParaRPr lang="en-SG"/>
           </a:p>
@@ -2716,7 +3388,7 @@
           <a:p>
             <a:fld id="{0DE02EAB-1EF7-43EE-8E62-1A307D75968C}" type="datetimeFigureOut">
               <a:rPr lang="en-SG" smtClean="0"/>
-              <a:t>25/3/2018</a:t>
+              <a:t>3/4/2018</a:t>
             </a:fld>
             <a:endParaRPr lang="en-SG"/>
           </a:p>
@@ -2959,7 +3631,7 @@
           <a:p>
             <a:fld id="{0DE02EAB-1EF7-43EE-8E62-1A307D75968C}" type="datetimeFigureOut">
               <a:rPr lang="en-SG" smtClean="0"/>
-              <a:t>25/3/2018</a:t>
+              <a:t>3/4/2018</a:t>
             </a:fld>
             <a:endParaRPr lang="en-SG"/>
           </a:p>
@@ -3390,8 +4062,8 @@
         </p:nvSpPr>
         <p:spPr>
           <a:xfrm>
-            <a:off x="546100" y="532341"/>
-            <a:ext cx="10465201" cy="5911773"/>
+            <a:off x="59094" y="67256"/>
+            <a:ext cx="11181829" cy="6721357"/>
           </a:xfrm>
           <a:prstGeom prst="roundRect">
             <a:avLst>
@@ -3457,7 +4129,7 @@
         </p:nvSpPr>
         <p:spPr>
           <a:xfrm>
-            <a:off x="1950102" y="1068603"/>
+            <a:off x="1426013" y="370103"/>
             <a:ext cx="1106534" cy="307851"/>
           </a:xfrm>
           <a:prstGeom prst="rect">
@@ -3524,8 +4196,8 @@
         </p:nvCxnSpPr>
         <p:spPr>
           <a:xfrm>
-            <a:off x="2472566" y="1415080"/>
-            <a:ext cx="17109" cy="4917986"/>
+            <a:off x="1935776" y="636147"/>
+            <a:ext cx="10934" cy="6152466"/>
           </a:xfrm>
           <a:prstGeom prst="line">
             <a:avLst/>
@@ -3567,8 +4239,8 @@
         </p:nvSpPr>
         <p:spPr>
           <a:xfrm>
-            <a:off x="2414995" y="1765775"/>
-            <a:ext cx="126448" cy="4357310"/>
+            <a:off x="1885555" y="1067275"/>
+            <a:ext cx="148732" cy="5555326"/>
           </a:xfrm>
           <a:prstGeom prst="rect">
             <a:avLst/>
@@ -3620,7 +4292,7 @@
         </p:nvSpPr>
         <p:spPr>
           <a:xfrm>
-            <a:off x="3796102" y="1065959"/>
+            <a:off x="3458280" y="367459"/>
             <a:ext cx="1600201" cy="346757"/>
           </a:xfrm>
           <a:prstGeom prst="rect">
@@ -3697,9 +4369,9 @@
           <p:nvPr/>
         </p:nvCxnSpPr>
         <p:spPr>
-          <a:xfrm>
-            <a:off x="4616658" y="1412717"/>
-            <a:ext cx="0" cy="4696829"/>
+          <a:xfrm flipH="1">
+            <a:off x="4258381" y="714217"/>
+            <a:ext cx="20455" cy="4200683"/>
           </a:xfrm>
           <a:prstGeom prst="line">
             <a:avLst/>
@@ -3741,8 +4413,8 @@
         </p:nvSpPr>
         <p:spPr>
           <a:xfrm>
-            <a:off x="4551090" y="1903268"/>
-            <a:ext cx="137783" cy="4084358"/>
+            <a:off x="4197010" y="1204768"/>
+            <a:ext cx="154041" cy="3585392"/>
           </a:xfrm>
           <a:prstGeom prst="rect">
             <a:avLst/>
@@ -3794,8 +4466,8 @@
         </p:nvSpPr>
         <p:spPr>
           <a:xfrm>
-            <a:off x="5887554" y="2170072"/>
-            <a:ext cx="213295" cy="3678510"/>
+            <a:off x="5557762" y="1471572"/>
+            <a:ext cx="205265" cy="3206085"/>
           </a:xfrm>
           <a:prstGeom prst="rect">
             <a:avLst/>
@@ -3849,7 +4521,7 @@
         </p:nvCxnSpPr>
         <p:spPr>
           <a:xfrm>
-            <a:off x="556169" y="1769459"/>
+            <a:off x="32080" y="1070959"/>
             <a:ext cx="1870860" cy="0"/>
           </a:xfrm>
           <a:prstGeom prst="straightConnector1">
@@ -3891,7 +4563,7 @@
         </p:nvSpPr>
         <p:spPr>
           <a:xfrm>
-            <a:off x="533400" y="1513234"/>
+            <a:off x="89748" y="865534"/>
             <a:ext cx="1819074" cy="184666"/>
           </a:xfrm>
           <a:prstGeom prst="rect">
@@ -3912,7 +4584,7 @@
                   <a:srgbClr val="0070C0"/>
                 </a:solidFill>
               </a:rPr>
-              <a:t>execute(“addtheater”)</a:t>
+              <a:t>execute(“addtheater 1 th/3”)</a:t>
             </a:r>
           </a:p>
         </p:txBody>
@@ -3933,7 +4605,7 @@
         </p:nvCxnSpPr>
         <p:spPr>
           <a:xfrm>
-            <a:off x="640629" y="6099541"/>
+            <a:off x="140691" y="6608226"/>
             <a:ext cx="1771891" cy="10005"/>
           </a:xfrm>
           <a:prstGeom prst="straightConnector1">
@@ -3977,7 +4649,7 @@
         </p:nvSpPr>
         <p:spPr>
           <a:xfrm>
-            <a:off x="2307257" y="1706472"/>
+            <a:off x="1969435" y="1007972"/>
             <a:ext cx="2288946" cy="184666"/>
           </a:xfrm>
           <a:prstGeom prst="rect">
@@ -4004,7 +4676,7 @@
           <a:p>
             <a:r>
               <a:rPr lang="en-US" sz="1200" dirty="0"/>
-              <a:t>parseCommand(“addtheater”)</a:t>
+              <a:t>parseCommand(“addtheater th/3”)</a:t>
             </a:r>
           </a:p>
         </p:txBody>
@@ -4023,7 +4695,7 @@
         </p:nvSpPr>
         <p:spPr>
           <a:xfrm>
-            <a:off x="1094217" y="5885939"/>
+            <a:off x="501179" y="6402800"/>
             <a:ext cx="1296605" cy="184666"/>
           </a:xfrm>
           <a:prstGeom prst="rect">
@@ -4050,7 +4722,7 @@
           <a:p>
             <a:r>
               <a:rPr lang="en-US" sz="1200" dirty="0"/>
-              <a:t>commandResult</a:t>
+              <a:t>result</a:t>
             </a:r>
           </a:p>
         </p:txBody>
@@ -4071,8 +4743,8 @@
         </p:nvCxnSpPr>
         <p:spPr>
           <a:xfrm>
-            <a:off x="2489675" y="1925314"/>
-            <a:ext cx="2052153" cy="0"/>
+            <a:off x="2034287" y="1226814"/>
+            <a:ext cx="2169719" cy="0"/>
           </a:xfrm>
           <a:prstGeom prst="straightConnector1">
             <a:avLst/>
@@ -4113,7 +4785,7 @@
         </p:nvSpPr>
         <p:spPr>
           <a:xfrm>
-            <a:off x="4915399" y="1827418"/>
+            <a:off x="4577577" y="1128918"/>
             <a:ext cx="2126018" cy="346757"/>
           </a:xfrm>
           <a:prstGeom prst="rect">
@@ -4189,7 +4861,7 @@
         </p:nvSpPr>
         <p:spPr>
           <a:xfrm>
-            <a:off x="8007423" y="1105616"/>
+            <a:off x="8026462" y="417481"/>
             <a:ext cx="837885" cy="346757"/>
           </a:xfrm>
           <a:prstGeom prst="rect">
@@ -4256,8 +4928,8 @@
         </p:nvCxnSpPr>
         <p:spPr>
           <a:xfrm>
-            <a:off x="8442755" y="1359184"/>
-            <a:ext cx="7654" cy="3069808"/>
+            <a:off x="8421896" y="661402"/>
+            <a:ext cx="1614" cy="2848443"/>
           </a:xfrm>
           <a:prstGeom prst="line">
             <a:avLst/>
@@ -4301,7 +4973,7 @@
         </p:nvCxnSpPr>
         <p:spPr>
           <a:xfrm flipV="1">
-            <a:off x="6128789" y="5215122"/>
+            <a:off x="5790967" y="3912102"/>
             <a:ext cx="2888032" cy="2535"/>
           </a:xfrm>
           <a:prstGeom prst="straightConnector1">
@@ -4343,7 +5015,7 @@
         </p:nvSpPr>
         <p:spPr>
           <a:xfrm>
-            <a:off x="6206686" y="4819851"/>
+            <a:off x="5869066" y="3522963"/>
             <a:ext cx="2847136" cy="369332"/>
           </a:xfrm>
           <a:prstGeom prst="rect">
@@ -4399,8 +5071,8 @@
         </p:nvCxnSpPr>
         <p:spPr>
           <a:xfrm flipV="1">
-            <a:off x="6140924" y="5765360"/>
-            <a:ext cx="3646936" cy="22893"/>
+            <a:off x="5737450" y="4466187"/>
+            <a:ext cx="3710228" cy="14516"/>
           </a:xfrm>
           <a:prstGeom prst="straightConnector1">
             <a:avLst/>
@@ -4429,12 +5101,104 @@
           </a:fontRef>
         </p:style>
       </p:cxnSp>
-      <p:sp>
-        <p:nvSpPr>
-          <p:cNvPr id="51" name="TextBox 50">
-            <a:extLst>
-              <a:ext uri="{FF2B5EF4-FFF2-40B4-BE49-F238E27FC236}">
-                <a16:creationId xmlns:a16="http://schemas.microsoft.com/office/drawing/2014/main" id="{DD94266B-D533-4679-B0FD-E826FEA96AEF}"/>
+      <p:cxnSp>
+        <p:nvCxnSpPr>
+          <p:cNvPr id="52" name="Straight Arrow Connector 51">
+            <a:extLst>
+              <a:ext uri="{FF2B5EF4-FFF2-40B4-BE49-F238E27FC236}">
+                <a16:creationId xmlns:a16="http://schemas.microsoft.com/office/drawing/2014/main" id="{3D1911C6-3EAD-4375-BC4E-848CA75ACDE2}"/>
+              </a:ext>
+            </a:extLst>
+          </p:cNvPr>
+          <p:cNvCxnSpPr>
+            <a:cxnSpLocks/>
+          </p:cNvCxnSpPr>
+          <p:nvPr/>
+        </p:nvCxnSpPr>
+        <p:spPr>
+          <a:xfrm>
+            <a:off x="4351052" y="4668752"/>
+            <a:ext cx="1267984" cy="0"/>
+          </a:xfrm>
+          <a:prstGeom prst="straightConnector1">
+            <a:avLst/>
+          </a:prstGeom>
+          <a:ln w="19050">
+            <a:solidFill>
+              <a:schemeClr val="accent1"/>
+            </a:solidFill>
+            <a:prstDash val="sysDash"/>
+            <a:headEnd type="arrow" w="med" len="med"/>
+            <a:tailEnd type="none" w="med" len="med"/>
+          </a:ln>
+        </p:spPr>
+        <p:style>
+          <a:lnRef idx="1">
+            <a:schemeClr val="accent1"/>
+          </a:lnRef>
+          <a:fillRef idx="0">
+            <a:schemeClr val="accent1"/>
+          </a:fillRef>
+          <a:effectRef idx="0">
+            <a:schemeClr val="accent1"/>
+          </a:effectRef>
+          <a:fontRef idx="minor">
+            <a:schemeClr val="tx1"/>
+          </a:fontRef>
+        </p:style>
+      </p:cxnSp>
+      <p:cxnSp>
+        <p:nvCxnSpPr>
+          <p:cNvPr id="54" name="Straight Arrow Connector 53">
+            <a:extLst>
+              <a:ext uri="{FF2B5EF4-FFF2-40B4-BE49-F238E27FC236}">
+                <a16:creationId xmlns:a16="http://schemas.microsoft.com/office/drawing/2014/main" id="{19DA6CFA-1F0F-42FE-B9AC-6569474BDAFD}"/>
+              </a:ext>
+            </a:extLst>
+          </p:cNvPr>
+          <p:cNvCxnSpPr>
+            <a:cxnSpLocks/>
+          </p:cNvCxnSpPr>
+          <p:nvPr/>
+        </p:nvCxnSpPr>
+        <p:spPr>
+          <a:xfrm flipV="1">
+            <a:off x="2007260" y="4779635"/>
+            <a:ext cx="2203934" cy="10525"/>
+          </a:xfrm>
+          <a:prstGeom prst="straightConnector1">
+            <a:avLst/>
+          </a:prstGeom>
+          <a:ln w="19050">
+            <a:solidFill>
+              <a:schemeClr val="accent1"/>
+            </a:solidFill>
+            <a:prstDash val="sysDash"/>
+            <a:headEnd type="arrow" w="med" len="med"/>
+            <a:tailEnd type="none" w="med" len="med"/>
+          </a:ln>
+        </p:spPr>
+        <p:style>
+          <a:lnRef idx="1">
+            <a:schemeClr val="accent1"/>
+          </a:lnRef>
+          <a:fillRef idx="0">
+            <a:schemeClr val="accent1"/>
+          </a:fillRef>
+          <a:effectRef idx="0">
+            <a:schemeClr val="accent1"/>
+          </a:effectRef>
+          <a:fontRef idx="minor">
+            <a:schemeClr val="tx1"/>
+          </a:fontRef>
+        </p:style>
+      </p:cxnSp>
+      <p:sp>
+        <p:nvSpPr>
+          <p:cNvPr id="55" name="TextBox 54">
+            <a:extLst>
+              <a:ext uri="{FF2B5EF4-FFF2-40B4-BE49-F238E27FC236}">
+                <a16:creationId xmlns:a16="http://schemas.microsoft.com/office/drawing/2014/main" id="{2E443D7A-4ED4-4D99-8922-6AD3BCF0CCF6}"/>
               </a:ext>
             </a:extLst>
           </p:cNvPr>
@@ -4443,8 +5207,8 @@
         </p:nvSpPr>
         <p:spPr>
           <a:xfrm>
-            <a:off x="8346890" y="5546556"/>
-            <a:ext cx="1413423" cy="184666"/>
+            <a:off x="2748959" y="4582839"/>
+            <a:ext cx="1065304" cy="184666"/>
           </a:xfrm>
           <a:prstGeom prst="rect">
             <a:avLst/>
@@ -4468,19 +5232,20 @@
             </a:lvl1pPr>
           </a:lstStyle>
           <a:p>
+            <a:pPr algn="ctr"/>
             <a:r>
               <a:rPr lang="en-US" sz="1200" dirty="0"/>
-              <a:t>commandResult</a:t>
+              <a:t>at</a:t>
             </a:r>
           </a:p>
         </p:txBody>
       </p:sp>
       <p:cxnSp>
         <p:nvCxnSpPr>
-          <p:cNvPr id="52" name="Straight Arrow Connector 51">
-            <a:extLst>
-              <a:ext uri="{FF2B5EF4-FFF2-40B4-BE49-F238E27FC236}">
-                <a16:creationId xmlns:a16="http://schemas.microsoft.com/office/drawing/2014/main" id="{3D1911C6-3EAD-4375-BC4E-848CA75ACDE2}"/>
+          <p:cNvPr id="56" name="Straight Arrow Connector 55">
+            <a:extLst>
+              <a:ext uri="{FF2B5EF4-FFF2-40B4-BE49-F238E27FC236}">
+                <a16:creationId xmlns:a16="http://schemas.microsoft.com/office/drawing/2014/main" id="{F1F468B3-C926-4525-9532-2DCBF65CB921}"/>
               </a:ext>
             </a:extLst>
           </p:cNvPr>
@@ -4491,19 +5256,17 @@
         </p:nvCxnSpPr>
         <p:spPr>
           <a:xfrm>
-            <a:off x="4688874" y="5843502"/>
-            <a:ext cx="1267984" cy="0"/>
+            <a:off x="4351052" y="1384027"/>
+            <a:ext cx="216792" cy="0"/>
           </a:xfrm>
           <a:prstGeom prst="straightConnector1">
             <a:avLst/>
           </a:prstGeom>
           <a:ln w="19050">
             <a:solidFill>
-              <a:schemeClr val="accent1"/>
+              <a:srgbClr val="0070C0"/>
             </a:solidFill>
-            <a:prstDash val="sysDash"/>
-            <a:headEnd type="arrow" w="med" len="med"/>
-            <a:tailEnd type="none" w="med" len="med"/>
+            <a:tailEnd type="arrow"/>
           </a:ln>
         </p:spPr>
         <p:style>
@@ -4521,12 +5284,394 @@
           </a:fontRef>
         </p:style>
       </p:cxnSp>
-      <p:sp>
-        <p:nvSpPr>
-          <p:cNvPr id="53" name="TextBox 52">
-            <a:extLst>
-              <a:ext uri="{FF2B5EF4-FFF2-40B4-BE49-F238E27FC236}">
-                <a16:creationId xmlns:a16="http://schemas.microsoft.com/office/drawing/2014/main" id="{1BB45041-2D5E-488A-9FBF-B0F0F261A1A9}"/>
+      <p:cxnSp>
+        <p:nvCxnSpPr>
+          <p:cNvPr id="115" name="Straight Arrow Connector 114">
+            <a:extLst>
+              <a:ext uri="{FF2B5EF4-FFF2-40B4-BE49-F238E27FC236}">
+                <a16:creationId xmlns:a16="http://schemas.microsoft.com/office/drawing/2014/main" id="{A5910ED8-29F3-474E-8DA2-7A0389F2A4D7}"/>
+              </a:ext>
+            </a:extLst>
+          </p:cNvPr>
+          <p:cNvCxnSpPr>
+            <a:cxnSpLocks/>
+          </p:cNvCxnSpPr>
+          <p:nvPr/>
+        </p:nvCxnSpPr>
+        <p:spPr>
+          <a:xfrm>
+            <a:off x="5801177" y="2473621"/>
+            <a:ext cx="2563799" cy="8005"/>
+          </a:xfrm>
+          <a:prstGeom prst="straightConnector1">
+            <a:avLst/>
+          </a:prstGeom>
+          <a:ln w="19050">
+            <a:solidFill>
+              <a:srgbClr val="0070C0"/>
+            </a:solidFill>
+            <a:tailEnd type="arrow"/>
+          </a:ln>
+        </p:spPr>
+        <p:style>
+          <a:lnRef idx="1">
+            <a:schemeClr val="accent1"/>
+          </a:lnRef>
+          <a:fillRef idx="0">
+            <a:schemeClr val="accent1"/>
+          </a:fillRef>
+          <a:effectRef idx="0">
+            <a:schemeClr val="accent1"/>
+          </a:effectRef>
+          <a:fontRef idx="minor">
+            <a:schemeClr val="tx1"/>
+          </a:fontRef>
+        </p:style>
+      </p:cxnSp>
+      <p:sp>
+        <p:nvSpPr>
+          <p:cNvPr id="139" name="Rectangle 62">
+            <a:extLst>
+              <a:ext uri="{FF2B5EF4-FFF2-40B4-BE49-F238E27FC236}">
+                <a16:creationId xmlns:a16="http://schemas.microsoft.com/office/drawing/2014/main" id="{9AAC540A-DE02-4540-B7C9-9C9C83248251}"/>
+              </a:ext>
+            </a:extLst>
+          </p:cNvPr>
+          <p:cNvSpPr/>
+          <p:nvPr/>
+        </p:nvSpPr>
+        <p:spPr>
+          <a:xfrm>
+            <a:off x="8668208" y="3753587"/>
+            <a:ext cx="1828800" cy="346757"/>
+          </a:xfrm>
+          <a:prstGeom prst="rect">
+            <a:avLst/>
+          </a:prstGeom>
+          <a:solidFill>
+            <a:srgbClr val="0070C0"/>
+          </a:solidFill>
+          <a:ln w="19050">
+            <a:solidFill>
+              <a:srgbClr val="0070C0"/>
+            </a:solidFill>
+          </a:ln>
+          <a:effectLst/>
+        </p:spPr>
+        <p:style>
+          <a:lnRef idx="1">
+            <a:schemeClr val="accent2"/>
+          </a:lnRef>
+          <a:fillRef idx="2">
+            <a:schemeClr val="accent2"/>
+          </a:fillRef>
+          <a:effectRef idx="1">
+            <a:schemeClr val="accent2"/>
+          </a:effectRef>
+          <a:fontRef idx="minor">
+            <a:schemeClr val="dk1"/>
+          </a:fontRef>
+        </p:style>
+        <p:txBody>
+          <a:bodyPr rtlCol="0" anchor="ctr"/>
+          <a:lstStyle/>
+          <a:p>
+            <a:pPr algn="ctr"/>
+            <a:r>
+              <a:rPr lang="en-US" sz="1200" dirty="0">
+                <a:solidFill>
+                  <a:schemeClr val="bg1"/>
+                </a:solidFill>
+              </a:rPr>
+              <a:t>at:AddTheaterCommand</a:t>
+            </a:r>
+            <a:endParaRPr lang="en-SG" sz="1200" dirty="0">
+              <a:solidFill>
+                <a:schemeClr val="bg1"/>
+              </a:solidFill>
+            </a:endParaRPr>
+          </a:p>
+        </p:txBody>
+      </p:sp>
+      <p:sp>
+        <p:nvSpPr>
+          <p:cNvPr id="140" name="Rectangle 139">
+            <a:extLst>
+              <a:ext uri="{FF2B5EF4-FFF2-40B4-BE49-F238E27FC236}">
+                <a16:creationId xmlns:a16="http://schemas.microsoft.com/office/drawing/2014/main" id="{8D43EF85-01BA-4FE2-8FDA-CAE84631D688}"/>
+              </a:ext>
+            </a:extLst>
+          </p:cNvPr>
+          <p:cNvSpPr/>
+          <p:nvPr/>
+        </p:nvSpPr>
+        <p:spPr>
+          <a:xfrm flipH="1">
+            <a:off x="9450036" y="4104273"/>
+            <a:ext cx="195459" cy="373442"/>
+          </a:xfrm>
+          <a:prstGeom prst="rect">
+            <a:avLst/>
+          </a:prstGeom>
+          <a:solidFill>
+            <a:srgbClr val="0070C0"/>
+          </a:solidFill>
+          <a:ln>
+            <a:solidFill>
+              <a:srgbClr val="0070C0"/>
+            </a:solidFill>
+          </a:ln>
+          <a:effectLst/>
+        </p:spPr>
+        <p:style>
+          <a:lnRef idx="1">
+            <a:schemeClr val="accent3"/>
+          </a:lnRef>
+          <a:fillRef idx="2">
+            <a:schemeClr val="accent3"/>
+          </a:fillRef>
+          <a:effectRef idx="1">
+            <a:schemeClr val="accent3"/>
+          </a:effectRef>
+          <a:fontRef idx="minor">
+            <a:schemeClr val="dk1"/>
+          </a:fontRef>
+        </p:style>
+        <p:txBody>
+          <a:bodyPr rtlCol="0" anchor="ctr"/>
+          <a:lstStyle/>
+          <a:p>
+            <a:pPr algn="ctr"/>
+            <a:endParaRPr lang="en-SG" sz="1200" dirty="0"/>
+          </a:p>
+        </p:txBody>
+      </p:sp>
+      <p:sp>
+        <p:nvSpPr>
+          <p:cNvPr id="43" name="Rectangle 62">
+            <a:extLst>
+              <a:ext uri="{FF2B5EF4-FFF2-40B4-BE49-F238E27FC236}">
+                <a16:creationId xmlns:a16="http://schemas.microsoft.com/office/drawing/2014/main" id="{2DEC9B14-D5D5-46DF-B480-09FB79E8D2F2}"/>
+              </a:ext>
+            </a:extLst>
+          </p:cNvPr>
+          <p:cNvSpPr/>
+          <p:nvPr/>
+        </p:nvSpPr>
+        <p:spPr>
+          <a:xfrm>
+            <a:off x="6800917" y="414465"/>
+            <a:ext cx="1124694" cy="346757"/>
+          </a:xfrm>
+          <a:prstGeom prst="rect">
+            <a:avLst/>
+          </a:prstGeom>
+          <a:solidFill>
+            <a:srgbClr val="0070C0"/>
+          </a:solidFill>
+          <a:ln w="19050">
+            <a:solidFill>
+              <a:srgbClr val="0070C0"/>
+            </a:solidFill>
+          </a:ln>
+          <a:effectLst/>
+        </p:spPr>
+        <p:style>
+          <a:lnRef idx="1">
+            <a:schemeClr val="accent2"/>
+          </a:lnRef>
+          <a:fillRef idx="2">
+            <a:schemeClr val="accent2"/>
+          </a:fillRef>
+          <a:effectRef idx="1">
+            <a:schemeClr val="accent2"/>
+          </a:effectRef>
+          <a:fontRef idx="minor">
+            <a:schemeClr val="dk1"/>
+          </a:fontRef>
+        </p:style>
+        <p:txBody>
+          <a:bodyPr rtlCol="0" anchor="ctr"/>
+          <a:lstStyle/>
+          <a:p>
+            <a:pPr algn="ctr"/>
+            <a:r>
+              <a:rPr lang="en-US" sz="1200" dirty="0">
+                <a:solidFill>
+                  <a:schemeClr val="bg1"/>
+                </a:solidFill>
+              </a:rPr>
+              <a:t>:Argument</a:t>
+            </a:r>
+          </a:p>
+          <a:p>
+            <a:pPr algn="ctr"/>
+            <a:r>
+              <a:rPr lang="en-US" sz="1200" dirty="0">
+                <a:solidFill>
+                  <a:schemeClr val="bg1"/>
+                </a:solidFill>
+              </a:rPr>
+              <a:t>Multimap</a:t>
+            </a:r>
+            <a:endParaRPr lang="en-SG" sz="1200" dirty="0">
+              <a:solidFill>
+                <a:schemeClr val="bg1"/>
+              </a:solidFill>
+            </a:endParaRPr>
+          </a:p>
+        </p:txBody>
+      </p:sp>
+      <p:cxnSp>
+        <p:nvCxnSpPr>
+          <p:cNvPr id="44" name="Straight Connector 43">
+            <a:extLst>
+              <a:ext uri="{FF2B5EF4-FFF2-40B4-BE49-F238E27FC236}">
+                <a16:creationId xmlns:a16="http://schemas.microsoft.com/office/drawing/2014/main" id="{9E03F4BF-2E0D-4F29-BA67-766D8A053AD6}"/>
+              </a:ext>
+            </a:extLst>
+          </p:cNvPr>
+          <p:cNvCxnSpPr>
+            <a:cxnSpLocks/>
+            <a:stCxn id="43" idx="2"/>
+            <a:endCxn id="45" idx="0"/>
+          </p:cNvCxnSpPr>
+          <p:nvPr/>
+        </p:nvCxnSpPr>
+        <p:spPr>
+          <a:xfrm flipH="1">
+            <a:off x="7361650" y="761222"/>
+            <a:ext cx="1614" cy="1202342"/>
+          </a:xfrm>
+          <a:prstGeom prst="line">
+            <a:avLst/>
+          </a:prstGeom>
+          <a:ln w="19050">
+            <a:solidFill>
+              <a:srgbClr val="0070C0"/>
+            </a:solidFill>
+            <a:prstDash val="sysDash"/>
+          </a:ln>
+          <a:effectLst/>
+        </p:spPr>
+        <p:style>
+          <a:lnRef idx="1">
+            <a:schemeClr val="accent1"/>
+          </a:lnRef>
+          <a:fillRef idx="2">
+            <a:schemeClr val="accent1"/>
+          </a:fillRef>
+          <a:effectRef idx="1">
+            <a:schemeClr val="accent1"/>
+          </a:effectRef>
+          <a:fontRef idx="minor">
+            <a:schemeClr val="dk1"/>
+          </a:fontRef>
+        </p:style>
+      </p:cxnSp>
+      <p:sp>
+        <p:nvSpPr>
+          <p:cNvPr id="45" name="Rectangle 44">
+            <a:extLst>
+              <a:ext uri="{FF2B5EF4-FFF2-40B4-BE49-F238E27FC236}">
+                <a16:creationId xmlns:a16="http://schemas.microsoft.com/office/drawing/2014/main" id="{C4D7CA3B-8A4E-460C-B7A3-361B30B46DD9}"/>
+              </a:ext>
+            </a:extLst>
+          </p:cNvPr>
+          <p:cNvSpPr/>
+          <p:nvPr/>
+        </p:nvSpPr>
+        <p:spPr>
+          <a:xfrm>
+            <a:off x="7242108" y="1963564"/>
+            <a:ext cx="239084" cy="247702"/>
+          </a:xfrm>
+          <a:prstGeom prst="rect">
+            <a:avLst/>
+          </a:prstGeom>
+          <a:solidFill>
+            <a:srgbClr val="0070C0"/>
+          </a:solidFill>
+          <a:ln>
+            <a:solidFill>
+              <a:srgbClr val="0070C0"/>
+            </a:solidFill>
+          </a:ln>
+          <a:effectLst/>
+        </p:spPr>
+        <p:style>
+          <a:lnRef idx="1">
+            <a:schemeClr val="accent3"/>
+          </a:lnRef>
+          <a:fillRef idx="2">
+            <a:schemeClr val="accent3"/>
+          </a:fillRef>
+          <a:effectRef idx="1">
+            <a:schemeClr val="accent3"/>
+          </a:effectRef>
+          <a:fontRef idx="minor">
+            <a:schemeClr val="dk1"/>
+          </a:fontRef>
+        </p:style>
+        <p:txBody>
+          <a:bodyPr rtlCol="0" anchor="ctr"/>
+          <a:lstStyle/>
+          <a:p>
+            <a:pPr algn="ctr"/>
+            <a:endParaRPr lang="en-SG" sz="1200" dirty="0"/>
+          </a:p>
+        </p:txBody>
+      </p:sp>
+      <p:cxnSp>
+        <p:nvCxnSpPr>
+          <p:cNvPr id="46" name="Straight Arrow Connector 45">
+            <a:extLst>
+              <a:ext uri="{FF2B5EF4-FFF2-40B4-BE49-F238E27FC236}">
+                <a16:creationId xmlns:a16="http://schemas.microsoft.com/office/drawing/2014/main" id="{EEF844EE-BAD2-4716-82A6-FC3AF2CFC53F}"/>
+              </a:ext>
+            </a:extLst>
+          </p:cNvPr>
+          <p:cNvCxnSpPr>
+            <a:cxnSpLocks/>
+          </p:cNvCxnSpPr>
+          <p:nvPr/>
+        </p:nvCxnSpPr>
+        <p:spPr>
+          <a:xfrm>
+            <a:off x="5758178" y="1963769"/>
+            <a:ext cx="1483930" cy="0"/>
+          </a:xfrm>
+          <a:prstGeom prst="straightConnector1">
+            <a:avLst/>
+          </a:prstGeom>
+          <a:ln w="19050">
+            <a:solidFill>
+              <a:srgbClr val="0070C0"/>
+            </a:solidFill>
+            <a:tailEnd type="arrow"/>
+          </a:ln>
+        </p:spPr>
+        <p:style>
+          <a:lnRef idx="1">
+            <a:schemeClr val="accent1"/>
+          </a:lnRef>
+          <a:fillRef idx="0">
+            <a:schemeClr val="accent1"/>
+          </a:fillRef>
+          <a:effectRef idx="0">
+            <a:schemeClr val="accent1"/>
+          </a:effectRef>
+          <a:fontRef idx="minor">
+            <a:schemeClr val="tx1"/>
+          </a:fontRef>
+        </p:style>
+      </p:cxnSp>
+      <p:sp>
+        <p:nvSpPr>
+          <p:cNvPr id="57" name="TextBox 56">
+            <a:extLst>
+              <a:ext uri="{FF2B5EF4-FFF2-40B4-BE49-F238E27FC236}">
+                <a16:creationId xmlns:a16="http://schemas.microsoft.com/office/drawing/2014/main" id="{4039B2F3-4705-4A23-B4FF-B762DB0FF401}"/>
               </a:ext>
             </a:extLst>
           </p:cNvPr>
@@ -4535,8 +5680,8 @@
         </p:nvSpPr>
         <p:spPr>
           <a:xfrm>
-            <a:off x="4810516" y="5648827"/>
-            <a:ext cx="1037399" cy="184666"/>
+            <a:off x="5801611" y="1760627"/>
+            <a:ext cx="1028419" cy="184666"/>
           </a:xfrm>
           <a:prstGeom prst="rect">
             <a:avLst/>
@@ -4560,19 +5705,20 @@
             </a:lvl1pPr>
           </a:lstStyle>
           <a:p>
+            <a:pPr algn="l"/>
             <a:r>
               <a:rPr lang="en-US" sz="1200" dirty="0"/>
-              <a:t>commandResult</a:t>
+              <a:t>tokenize</a:t>
             </a:r>
           </a:p>
         </p:txBody>
       </p:sp>
       <p:cxnSp>
         <p:nvCxnSpPr>
-          <p:cNvPr id="54" name="Straight Arrow Connector 53">
-            <a:extLst>
-              <a:ext uri="{FF2B5EF4-FFF2-40B4-BE49-F238E27FC236}">
-                <a16:creationId xmlns:a16="http://schemas.microsoft.com/office/drawing/2014/main" id="{19DA6CFA-1F0F-42FE-B9AC-6569474BDAFD}"/>
+          <p:cNvPr id="58" name="Straight Arrow Connector 57">
+            <a:extLst>
+              <a:ext uri="{FF2B5EF4-FFF2-40B4-BE49-F238E27FC236}">
+                <a16:creationId xmlns:a16="http://schemas.microsoft.com/office/drawing/2014/main" id="{94D01E4C-E679-4304-8A72-C2BA88B800F6}"/>
               </a:ext>
             </a:extLst>
           </p:cNvPr>
@@ -4583,8 +5729,8 @@
         </p:nvCxnSpPr>
         <p:spPr>
           <a:xfrm>
-            <a:off x="2538135" y="5967084"/>
-            <a:ext cx="2010881" cy="1"/>
+            <a:off x="5761871" y="2196791"/>
+            <a:ext cx="1480237" cy="7456"/>
           </a:xfrm>
           <a:prstGeom prst="straightConnector1">
             <a:avLst/>
@@ -4615,10 +5761,109 @@
       </p:cxnSp>
       <p:sp>
         <p:nvSpPr>
-          <p:cNvPr id="55" name="TextBox 54">
-            <a:extLst>
-              <a:ext uri="{FF2B5EF4-FFF2-40B4-BE49-F238E27FC236}">
-                <a16:creationId xmlns:a16="http://schemas.microsoft.com/office/drawing/2014/main" id="{2E443D7A-4ED4-4D99-8922-6AD3BCF0CCF6}"/>
+          <p:cNvPr id="60" name="Rectangle 59">
+            <a:extLst>
+              <a:ext uri="{FF2B5EF4-FFF2-40B4-BE49-F238E27FC236}">
+                <a16:creationId xmlns:a16="http://schemas.microsoft.com/office/drawing/2014/main" id="{388664D5-7A3B-4D8A-B1B2-6658374B78D6}"/>
+              </a:ext>
+            </a:extLst>
+          </p:cNvPr>
+          <p:cNvSpPr/>
+          <p:nvPr/>
+        </p:nvSpPr>
+        <p:spPr>
+          <a:xfrm>
+            <a:off x="8344533" y="2472876"/>
+            <a:ext cx="170852" cy="247784"/>
+          </a:xfrm>
+          <a:prstGeom prst="rect">
+            <a:avLst/>
+          </a:prstGeom>
+          <a:solidFill>
+            <a:srgbClr val="0070C0"/>
+          </a:solidFill>
+          <a:ln>
+            <a:solidFill>
+              <a:srgbClr val="0070C0"/>
+            </a:solidFill>
+          </a:ln>
+          <a:effectLst/>
+        </p:spPr>
+        <p:style>
+          <a:lnRef idx="1">
+            <a:schemeClr val="accent3"/>
+          </a:lnRef>
+          <a:fillRef idx="2">
+            <a:schemeClr val="accent3"/>
+          </a:fillRef>
+          <a:effectRef idx="1">
+            <a:schemeClr val="accent3"/>
+          </a:effectRef>
+          <a:fontRef idx="minor">
+            <a:schemeClr val="dk1"/>
+          </a:fontRef>
+        </p:style>
+        <p:txBody>
+          <a:bodyPr rtlCol="0" anchor="ctr"/>
+          <a:lstStyle/>
+          <a:p>
+            <a:pPr algn="ctr"/>
+            <a:endParaRPr lang="en-SG" sz="1200" dirty="0"/>
+          </a:p>
+        </p:txBody>
+      </p:sp>
+      <p:cxnSp>
+        <p:nvCxnSpPr>
+          <p:cNvPr id="61" name="Straight Arrow Connector 60">
+            <a:extLst>
+              <a:ext uri="{FF2B5EF4-FFF2-40B4-BE49-F238E27FC236}">
+                <a16:creationId xmlns:a16="http://schemas.microsoft.com/office/drawing/2014/main" id="{E341C340-719D-4E7B-AAE7-21E6F471AB27}"/>
+              </a:ext>
+            </a:extLst>
+          </p:cNvPr>
+          <p:cNvCxnSpPr>
+            <a:cxnSpLocks/>
+          </p:cNvCxnSpPr>
+          <p:nvPr/>
+        </p:nvCxnSpPr>
+        <p:spPr>
+          <a:xfrm flipV="1">
+            <a:off x="5758178" y="2722033"/>
+            <a:ext cx="2608916" cy="183"/>
+          </a:xfrm>
+          <a:prstGeom prst="straightConnector1">
+            <a:avLst/>
+          </a:prstGeom>
+          <a:ln w="19050">
+            <a:solidFill>
+              <a:schemeClr val="accent1"/>
+            </a:solidFill>
+            <a:prstDash val="sysDash"/>
+            <a:headEnd type="arrow" w="med" len="med"/>
+            <a:tailEnd type="none" w="med" len="med"/>
+          </a:ln>
+        </p:spPr>
+        <p:style>
+          <a:lnRef idx="1">
+            <a:schemeClr val="accent1"/>
+          </a:lnRef>
+          <a:fillRef idx="0">
+            <a:schemeClr val="accent1"/>
+          </a:fillRef>
+          <a:effectRef idx="0">
+            <a:schemeClr val="accent1"/>
+          </a:effectRef>
+          <a:fontRef idx="minor">
+            <a:schemeClr val="tx1"/>
+          </a:fontRef>
+        </p:style>
+      </p:cxnSp>
+      <p:sp>
+        <p:nvSpPr>
+          <p:cNvPr id="74" name="TextBox 73">
+            <a:extLst>
+              <a:ext uri="{FF2B5EF4-FFF2-40B4-BE49-F238E27FC236}">
+                <a16:creationId xmlns:a16="http://schemas.microsoft.com/office/drawing/2014/main" id="{195E00E5-6029-41FB-9E42-759158BB39E6}"/>
               </a:ext>
             </a:extLst>
           </p:cNvPr>
@@ -4627,8 +5872,8 @@
         </p:nvSpPr>
         <p:spPr>
           <a:xfrm>
-            <a:off x="3453612" y="5770288"/>
-            <a:ext cx="1065304" cy="184666"/>
+            <a:off x="5790967" y="2287914"/>
+            <a:ext cx="1028419" cy="184666"/>
           </a:xfrm>
           <a:prstGeom prst="rect">
             <a:avLst/>
@@ -4652,445 +5897,20 @@
             </a:lvl1pPr>
           </a:lstStyle>
           <a:p>
+            <a:pPr algn="l"/>
             <a:r>
               <a:rPr lang="en-US" sz="1200" dirty="0"/>
-              <a:t>commandResult</a:t>
-            </a:r>
-          </a:p>
-        </p:txBody>
-      </p:sp>
-      <p:cxnSp>
-        <p:nvCxnSpPr>
-          <p:cNvPr id="56" name="Straight Arrow Connector 55">
-            <a:extLst>
-              <a:ext uri="{FF2B5EF4-FFF2-40B4-BE49-F238E27FC236}">
-                <a16:creationId xmlns:a16="http://schemas.microsoft.com/office/drawing/2014/main" id="{F1F468B3-C926-4525-9532-2DCBF65CB921}"/>
-              </a:ext>
-            </a:extLst>
-          </p:cNvPr>
-          <p:cNvCxnSpPr>
-            <a:cxnSpLocks/>
-          </p:cNvCxnSpPr>
-          <p:nvPr/>
-        </p:nvCxnSpPr>
-        <p:spPr>
-          <a:xfrm>
-            <a:off x="4688874" y="2082527"/>
-            <a:ext cx="216792" cy="0"/>
-          </a:xfrm>
-          <a:prstGeom prst="straightConnector1">
-            <a:avLst/>
-          </a:prstGeom>
-          <a:ln w="19050">
-            <a:solidFill>
-              <a:srgbClr val="0070C0"/>
-            </a:solidFill>
-            <a:tailEnd type="arrow"/>
-          </a:ln>
-        </p:spPr>
-        <p:style>
-          <a:lnRef idx="1">
-            <a:schemeClr val="accent1"/>
-          </a:lnRef>
-          <a:fillRef idx="0">
-            <a:schemeClr val="accent1"/>
-          </a:fillRef>
-          <a:effectRef idx="0">
-            <a:schemeClr val="accent1"/>
-          </a:effectRef>
-          <a:fontRef idx="minor">
-            <a:schemeClr val="tx1"/>
-          </a:fontRef>
-        </p:style>
-      </p:cxnSp>
-      <p:cxnSp>
-        <p:nvCxnSpPr>
-          <p:cNvPr id="115" name="Straight Arrow Connector 114">
-            <a:extLst>
-              <a:ext uri="{FF2B5EF4-FFF2-40B4-BE49-F238E27FC236}">
-                <a16:creationId xmlns:a16="http://schemas.microsoft.com/office/drawing/2014/main" id="{A5910ED8-29F3-474E-8DA2-7A0389F2A4D7}"/>
-              </a:ext>
-            </a:extLst>
-          </p:cNvPr>
-          <p:cNvCxnSpPr>
-            <a:cxnSpLocks/>
-          </p:cNvCxnSpPr>
-          <p:nvPr/>
-        </p:nvCxnSpPr>
-        <p:spPr>
-          <a:xfrm>
-            <a:off x="6133023" y="3107369"/>
-            <a:ext cx="2252113" cy="12452"/>
-          </a:xfrm>
-          <a:prstGeom prst="straightConnector1">
-            <a:avLst/>
-          </a:prstGeom>
-          <a:ln w="19050">
-            <a:solidFill>
-              <a:srgbClr val="0070C0"/>
-            </a:solidFill>
-            <a:tailEnd type="arrow"/>
-          </a:ln>
-        </p:spPr>
-        <p:style>
-          <a:lnRef idx="1">
-            <a:schemeClr val="accent1"/>
-          </a:lnRef>
-          <a:fillRef idx="0">
-            <a:schemeClr val="accent1"/>
-          </a:fillRef>
-          <a:effectRef idx="0">
-            <a:schemeClr val="accent1"/>
-          </a:effectRef>
-          <a:fontRef idx="minor">
-            <a:schemeClr val="tx1"/>
-          </a:fontRef>
-        </p:style>
-      </p:cxnSp>
-      <p:sp>
-        <p:nvSpPr>
-          <p:cNvPr id="139" name="Rectangle 62">
-            <a:extLst>
-              <a:ext uri="{FF2B5EF4-FFF2-40B4-BE49-F238E27FC236}">
-                <a16:creationId xmlns:a16="http://schemas.microsoft.com/office/drawing/2014/main" id="{9AAC540A-DE02-4540-B7C9-9C9C83248251}"/>
-              </a:ext>
-            </a:extLst>
-          </p:cNvPr>
-          <p:cNvSpPr/>
-          <p:nvPr/>
-        </p:nvSpPr>
-        <p:spPr>
-          <a:xfrm>
-            <a:off x="9006030" y="5056607"/>
-            <a:ext cx="1828800" cy="346757"/>
-          </a:xfrm>
-          <a:prstGeom prst="rect">
-            <a:avLst/>
-          </a:prstGeom>
-          <a:solidFill>
-            <a:srgbClr val="0070C0"/>
-          </a:solidFill>
-          <a:ln w="19050">
-            <a:solidFill>
-              <a:srgbClr val="0070C0"/>
-            </a:solidFill>
-          </a:ln>
-          <a:effectLst/>
-        </p:spPr>
-        <p:style>
-          <a:lnRef idx="1">
-            <a:schemeClr val="accent2"/>
-          </a:lnRef>
-          <a:fillRef idx="2">
-            <a:schemeClr val="accent2"/>
-          </a:fillRef>
-          <a:effectRef idx="1">
-            <a:schemeClr val="accent2"/>
-          </a:effectRef>
-          <a:fontRef idx="minor">
-            <a:schemeClr val="dk1"/>
-          </a:fontRef>
-        </p:style>
-        <p:txBody>
-          <a:bodyPr rtlCol="0" anchor="ctr"/>
-          <a:lstStyle/>
-          <a:p>
-            <a:pPr algn="ctr"/>
-            <a:r>
-              <a:rPr lang="en-US" sz="1200" dirty="0">
-                <a:solidFill>
-                  <a:schemeClr val="bg1"/>
-                </a:solidFill>
-              </a:rPr>
-              <a:t>:AddTheaterCommand</a:t>
-            </a:r>
-            <a:endParaRPr lang="en-SG" sz="1200" dirty="0">
-              <a:solidFill>
-                <a:schemeClr val="bg1"/>
-              </a:solidFill>
-            </a:endParaRPr>
-          </a:p>
-        </p:txBody>
-      </p:sp>
-      <p:sp>
-        <p:nvSpPr>
-          <p:cNvPr id="140" name="Rectangle 139">
-            <a:extLst>
-              <a:ext uri="{FF2B5EF4-FFF2-40B4-BE49-F238E27FC236}">
-                <a16:creationId xmlns:a16="http://schemas.microsoft.com/office/drawing/2014/main" id="{8D43EF85-01BA-4FE2-8FDA-CAE84631D688}"/>
-              </a:ext>
-            </a:extLst>
-          </p:cNvPr>
-          <p:cNvSpPr/>
-          <p:nvPr/>
-        </p:nvSpPr>
-        <p:spPr>
-          <a:xfrm flipH="1">
-            <a:off x="9787859" y="5403365"/>
-            <a:ext cx="195459" cy="373442"/>
-          </a:xfrm>
-          <a:prstGeom prst="rect">
-            <a:avLst/>
-          </a:prstGeom>
-          <a:solidFill>
-            <a:srgbClr val="0070C0"/>
-          </a:solidFill>
-          <a:ln>
-            <a:solidFill>
-              <a:srgbClr val="0070C0"/>
-            </a:solidFill>
-          </a:ln>
-          <a:effectLst/>
-        </p:spPr>
-        <p:style>
-          <a:lnRef idx="1">
-            <a:schemeClr val="accent3"/>
-          </a:lnRef>
-          <a:fillRef idx="2">
-            <a:schemeClr val="accent3"/>
-          </a:fillRef>
-          <a:effectRef idx="1">
-            <a:schemeClr val="accent3"/>
-          </a:effectRef>
-          <a:fontRef idx="minor">
-            <a:schemeClr val="dk1"/>
-          </a:fontRef>
-        </p:style>
-        <p:txBody>
-          <a:bodyPr rtlCol="0" anchor="ctr"/>
-          <a:lstStyle/>
-          <a:p>
-            <a:pPr algn="ctr"/>
-            <a:endParaRPr lang="en-SG" sz="1200" dirty="0"/>
-          </a:p>
-        </p:txBody>
-      </p:sp>
-      <p:sp>
-        <p:nvSpPr>
-          <p:cNvPr id="43" name="Rectangle 62">
-            <a:extLst>
-              <a:ext uri="{FF2B5EF4-FFF2-40B4-BE49-F238E27FC236}">
-                <a16:creationId xmlns:a16="http://schemas.microsoft.com/office/drawing/2014/main" id="{2DEC9B14-D5D5-46DF-B480-09FB79E8D2F2}"/>
-              </a:ext>
-            </a:extLst>
-          </p:cNvPr>
-          <p:cNvSpPr/>
-          <p:nvPr/>
-        </p:nvSpPr>
-        <p:spPr>
-          <a:xfrm>
-            <a:off x="6771897" y="1105616"/>
-            <a:ext cx="1124694" cy="346757"/>
-          </a:xfrm>
-          <a:prstGeom prst="rect">
-            <a:avLst/>
-          </a:prstGeom>
-          <a:solidFill>
-            <a:srgbClr val="0070C0"/>
-          </a:solidFill>
-          <a:ln w="19050">
-            <a:solidFill>
-              <a:srgbClr val="0070C0"/>
-            </a:solidFill>
-          </a:ln>
-          <a:effectLst/>
-        </p:spPr>
-        <p:style>
-          <a:lnRef idx="1">
-            <a:schemeClr val="accent2"/>
-          </a:lnRef>
-          <a:fillRef idx="2">
-            <a:schemeClr val="accent2"/>
-          </a:fillRef>
-          <a:effectRef idx="1">
-            <a:schemeClr val="accent2"/>
-          </a:effectRef>
-          <a:fontRef idx="minor">
-            <a:schemeClr val="dk1"/>
-          </a:fontRef>
-        </p:style>
-        <p:txBody>
-          <a:bodyPr rtlCol="0" anchor="ctr"/>
-          <a:lstStyle/>
-          <a:p>
-            <a:pPr algn="ctr"/>
-            <a:r>
-              <a:rPr lang="en-US" sz="1200" dirty="0">
-                <a:solidFill>
-                  <a:schemeClr val="bg1"/>
-                </a:solidFill>
-              </a:rPr>
-              <a:t>:Argument</a:t>
-            </a:r>
-          </a:p>
-          <a:p>
-            <a:pPr algn="ctr"/>
-            <a:r>
-              <a:rPr lang="en-US" sz="1200" dirty="0">
-                <a:solidFill>
-                  <a:schemeClr val="bg1"/>
-                </a:solidFill>
-              </a:rPr>
-              <a:t>Multimap</a:t>
-            </a:r>
-            <a:endParaRPr lang="en-SG" sz="1200" dirty="0">
-              <a:solidFill>
-                <a:schemeClr val="bg1"/>
-              </a:solidFill>
-            </a:endParaRPr>
-          </a:p>
-        </p:txBody>
-      </p:sp>
-      <p:cxnSp>
-        <p:nvCxnSpPr>
-          <p:cNvPr id="44" name="Straight Connector 43">
-            <a:extLst>
-              <a:ext uri="{FF2B5EF4-FFF2-40B4-BE49-F238E27FC236}">
-                <a16:creationId xmlns:a16="http://schemas.microsoft.com/office/drawing/2014/main" id="{9E03F4BF-2E0D-4F29-BA67-766D8A053AD6}"/>
-              </a:ext>
-            </a:extLst>
-          </p:cNvPr>
-          <p:cNvCxnSpPr>
-            <a:cxnSpLocks/>
-            <a:stCxn id="43" idx="2"/>
-            <a:endCxn id="45" idx="0"/>
-          </p:cNvCxnSpPr>
-          <p:nvPr/>
-        </p:nvCxnSpPr>
-        <p:spPr>
-          <a:xfrm flipH="1">
-            <a:off x="7330424" y="1452373"/>
-            <a:ext cx="3820" cy="1028120"/>
-          </a:xfrm>
-          <a:prstGeom prst="line">
-            <a:avLst/>
-          </a:prstGeom>
-          <a:ln w="19050">
-            <a:solidFill>
-              <a:srgbClr val="0070C0"/>
-            </a:solidFill>
-            <a:prstDash val="sysDash"/>
-          </a:ln>
-          <a:effectLst/>
-        </p:spPr>
-        <p:style>
-          <a:lnRef idx="1">
-            <a:schemeClr val="accent1"/>
-          </a:lnRef>
-          <a:fillRef idx="2">
-            <a:schemeClr val="accent1"/>
-          </a:fillRef>
-          <a:effectRef idx="1">
-            <a:schemeClr val="accent1"/>
-          </a:effectRef>
-          <a:fontRef idx="minor">
-            <a:schemeClr val="dk1"/>
-          </a:fontRef>
-        </p:style>
-      </p:cxnSp>
-      <p:sp>
-        <p:nvSpPr>
-          <p:cNvPr id="45" name="Rectangle 44">
-            <a:extLst>
-              <a:ext uri="{FF2B5EF4-FFF2-40B4-BE49-F238E27FC236}">
-                <a16:creationId xmlns:a16="http://schemas.microsoft.com/office/drawing/2014/main" id="{C4D7CA3B-8A4E-460C-B7A3-361B30B46DD9}"/>
-              </a:ext>
-            </a:extLst>
-          </p:cNvPr>
-          <p:cNvSpPr/>
-          <p:nvPr/>
-        </p:nvSpPr>
-        <p:spPr>
-          <a:xfrm>
-            <a:off x="7210882" y="2480493"/>
-            <a:ext cx="239084" cy="326875"/>
-          </a:xfrm>
-          <a:prstGeom prst="rect">
-            <a:avLst/>
-          </a:prstGeom>
-          <a:solidFill>
-            <a:srgbClr val="0070C0"/>
-          </a:solidFill>
-          <a:ln>
-            <a:solidFill>
-              <a:srgbClr val="0070C0"/>
-            </a:solidFill>
-          </a:ln>
-          <a:effectLst/>
-        </p:spPr>
-        <p:style>
-          <a:lnRef idx="1">
-            <a:schemeClr val="accent3"/>
-          </a:lnRef>
-          <a:fillRef idx="2">
-            <a:schemeClr val="accent3"/>
-          </a:fillRef>
-          <a:effectRef idx="1">
-            <a:schemeClr val="accent3"/>
-          </a:effectRef>
-          <a:fontRef idx="minor">
-            <a:schemeClr val="dk1"/>
-          </a:fontRef>
-        </p:style>
-        <p:txBody>
-          <a:bodyPr rtlCol="0" anchor="ctr"/>
-          <a:lstStyle/>
-          <a:p>
-            <a:pPr algn="ctr"/>
-            <a:endParaRPr lang="en-SG" sz="1200" dirty="0"/>
-          </a:p>
-        </p:txBody>
-      </p:sp>
-      <p:cxnSp>
-        <p:nvCxnSpPr>
-          <p:cNvPr id="46" name="Straight Arrow Connector 45">
-            <a:extLst>
-              <a:ext uri="{FF2B5EF4-FFF2-40B4-BE49-F238E27FC236}">
-                <a16:creationId xmlns:a16="http://schemas.microsoft.com/office/drawing/2014/main" id="{EEF844EE-BAD2-4716-82A6-FC3AF2CFC53F}"/>
-              </a:ext>
-            </a:extLst>
-          </p:cNvPr>
-          <p:cNvCxnSpPr>
-            <a:cxnSpLocks/>
-          </p:cNvCxnSpPr>
-          <p:nvPr/>
-        </p:nvCxnSpPr>
-        <p:spPr>
-          <a:xfrm>
-            <a:off x="6140924" y="2488350"/>
-            <a:ext cx="1069958" cy="4843"/>
-          </a:xfrm>
-          <a:prstGeom prst="straightConnector1">
-            <a:avLst/>
-          </a:prstGeom>
-          <a:ln w="19050">
-            <a:solidFill>
-              <a:srgbClr val="0070C0"/>
-            </a:solidFill>
-            <a:tailEnd type="arrow"/>
-          </a:ln>
-        </p:spPr>
-        <p:style>
-          <a:lnRef idx="1">
-            <a:schemeClr val="accent1"/>
-          </a:lnRef>
-          <a:fillRef idx="0">
-            <a:schemeClr val="accent1"/>
-          </a:fillRef>
-          <a:effectRef idx="0">
-            <a:schemeClr val="accent1"/>
-          </a:effectRef>
-          <a:fontRef idx="minor">
-            <a:schemeClr val="tx1"/>
-          </a:fontRef>
-        </p:style>
-      </p:cxnSp>
-      <p:sp>
-        <p:nvSpPr>
-          <p:cNvPr id="57" name="TextBox 56">
-            <a:extLst>
-              <a:ext uri="{FF2B5EF4-FFF2-40B4-BE49-F238E27FC236}">
-                <a16:creationId xmlns:a16="http://schemas.microsoft.com/office/drawing/2014/main" id="{4039B2F3-4705-4A23-B4FF-B762DB0FF401}"/>
+              <a:t>parseIndex(1)</a:t>
+            </a:r>
+          </a:p>
+        </p:txBody>
+      </p:sp>
+      <p:sp>
+        <p:nvSpPr>
+          <p:cNvPr id="75" name="TextBox 74">
+            <a:extLst>
+              <a:ext uri="{FF2B5EF4-FFF2-40B4-BE49-F238E27FC236}">
+                <a16:creationId xmlns:a16="http://schemas.microsoft.com/office/drawing/2014/main" id="{905ADEEF-71D5-4BC2-AF4B-41E95D0708F8}"/>
               </a:ext>
             </a:extLst>
           </p:cNvPr>
@@ -5099,7 +5919,7 @@
         </p:nvSpPr>
         <p:spPr>
           <a:xfrm>
-            <a:off x="6381953" y="2305748"/>
+            <a:off x="7976017" y="2728839"/>
             <a:ext cx="1028419" cy="184666"/>
           </a:xfrm>
           <a:prstGeom prst="rect">
@@ -5127,17 +5947,17 @@
             <a:pPr algn="l"/>
             <a:r>
               <a:rPr lang="en-US" sz="1200" dirty="0"/>
-              <a:t>tokenize</a:t>
+              <a:t>index</a:t>
             </a:r>
           </a:p>
         </p:txBody>
       </p:sp>
       <p:cxnSp>
         <p:nvCxnSpPr>
-          <p:cNvPr id="58" name="Straight Arrow Connector 57">
-            <a:extLst>
-              <a:ext uri="{FF2B5EF4-FFF2-40B4-BE49-F238E27FC236}">
-                <a16:creationId xmlns:a16="http://schemas.microsoft.com/office/drawing/2014/main" id="{94D01E4C-E679-4304-8A72-C2BA88B800F6}"/>
+          <p:cNvPr id="83" name="Straight Arrow Connector 82">
+            <a:extLst>
+              <a:ext uri="{FF2B5EF4-FFF2-40B4-BE49-F238E27FC236}">
+                <a16:creationId xmlns:a16="http://schemas.microsoft.com/office/drawing/2014/main" id="{4A186F8E-335A-4596-89DD-C6E405C2FC55}"/>
               </a:ext>
             </a:extLst>
           </p:cNvPr>
@@ -5147,20 +5967,18 @@
           <p:nvPr/>
         </p:nvCxnSpPr>
         <p:spPr>
-          <a:xfrm>
-            <a:off x="6099693" y="2802419"/>
-            <a:ext cx="1107316" cy="4303"/>
+          <a:xfrm flipV="1">
+            <a:off x="5657186" y="3071781"/>
+            <a:ext cx="2707790" cy="12732"/>
           </a:xfrm>
           <a:prstGeom prst="straightConnector1">
             <a:avLst/>
           </a:prstGeom>
           <a:ln w="19050">
             <a:solidFill>
-              <a:schemeClr val="accent1"/>
+              <a:srgbClr val="0070C0"/>
             </a:solidFill>
-            <a:prstDash val="sysDash"/>
-            <a:headEnd type="arrow" w="med" len="med"/>
-            <a:tailEnd type="none" w="med" len="med"/>
+            <a:tailEnd type="arrow"/>
           </a:ln>
         </p:spPr>
         <p:style>
@@ -5180,10 +5998,10 @@
       </p:cxnSp>
       <p:sp>
         <p:nvSpPr>
-          <p:cNvPr id="60" name="Rectangle 59">
-            <a:extLst>
-              <a:ext uri="{FF2B5EF4-FFF2-40B4-BE49-F238E27FC236}">
-                <a16:creationId xmlns:a16="http://schemas.microsoft.com/office/drawing/2014/main" id="{388664D5-7A3B-4D8A-B1B2-6658374B78D6}"/>
+          <p:cNvPr id="84" name="Rectangle 83">
+            <a:extLst>
+              <a:ext uri="{FF2B5EF4-FFF2-40B4-BE49-F238E27FC236}">
+                <a16:creationId xmlns:a16="http://schemas.microsoft.com/office/drawing/2014/main" id="{AA45F2ED-189C-4035-BA40-7B1260D59C50}"/>
               </a:ext>
             </a:extLst>
           </p:cNvPr>
@@ -5192,7 +6010,7 @@
         </p:nvSpPr>
         <p:spPr>
           <a:xfrm>
-            <a:off x="8364693" y="3120592"/>
+            <a:off x="8344124" y="3071781"/>
             <a:ext cx="170852" cy="247784"/>
           </a:xfrm>
           <a:prstGeom prst="rect">
@@ -5231,58 +6049,12 @@
           </a:p>
         </p:txBody>
       </p:sp>
-      <p:cxnSp>
-        <p:nvCxnSpPr>
-          <p:cNvPr id="61" name="Straight Arrow Connector 60">
-            <a:extLst>
-              <a:ext uri="{FF2B5EF4-FFF2-40B4-BE49-F238E27FC236}">
-                <a16:creationId xmlns:a16="http://schemas.microsoft.com/office/drawing/2014/main" id="{E341C340-719D-4E7B-AAE7-21E6F471AB27}"/>
-              </a:ext>
-            </a:extLst>
-          </p:cNvPr>
-          <p:cNvCxnSpPr>
-            <a:cxnSpLocks/>
-          </p:cNvCxnSpPr>
-          <p:nvPr/>
-        </p:nvCxnSpPr>
-        <p:spPr>
-          <a:xfrm>
-            <a:off x="6110112" y="3357693"/>
-            <a:ext cx="2277142" cy="2535"/>
-          </a:xfrm>
-          <a:prstGeom prst="straightConnector1">
-            <a:avLst/>
-          </a:prstGeom>
-          <a:ln w="19050">
-            <a:solidFill>
-              <a:schemeClr val="accent1"/>
-            </a:solidFill>
-            <a:prstDash val="sysDash"/>
-            <a:headEnd type="arrow" w="med" len="med"/>
-            <a:tailEnd type="none" w="med" len="med"/>
-          </a:ln>
-        </p:spPr>
-        <p:style>
-          <a:lnRef idx="1">
-            <a:schemeClr val="accent1"/>
-          </a:lnRef>
-          <a:fillRef idx="0">
-            <a:schemeClr val="accent1"/>
-          </a:fillRef>
-          <a:effectRef idx="0">
-            <a:schemeClr val="accent1"/>
-          </a:effectRef>
-          <a:fontRef idx="minor">
-            <a:schemeClr val="tx1"/>
-          </a:fontRef>
-        </p:style>
-      </p:cxnSp>
-      <p:sp>
-        <p:nvSpPr>
-          <p:cNvPr id="74" name="TextBox 73">
-            <a:extLst>
-              <a:ext uri="{FF2B5EF4-FFF2-40B4-BE49-F238E27FC236}">
-                <a16:creationId xmlns:a16="http://schemas.microsoft.com/office/drawing/2014/main" id="{195E00E5-6029-41FB-9E42-759158BB39E6}"/>
+      <p:sp>
+        <p:nvSpPr>
+          <p:cNvPr id="85" name="TextBox 84">
+            <a:extLst>
+              <a:ext uri="{FF2B5EF4-FFF2-40B4-BE49-F238E27FC236}">
+                <a16:creationId xmlns:a16="http://schemas.microsoft.com/office/drawing/2014/main" id="{B5D68205-2ABF-4CBF-ABDF-113F077A16AB}"/>
               </a:ext>
             </a:extLst>
           </p:cNvPr>
@@ -5291,8 +6063,8 @@
         </p:nvSpPr>
         <p:spPr>
           <a:xfrm>
-            <a:off x="6189193" y="2912449"/>
-            <a:ext cx="1028419" cy="184666"/>
+            <a:off x="5816193" y="2867308"/>
+            <a:ext cx="1194888" cy="184666"/>
           </a:xfrm>
           <a:prstGeom prst="rect">
             <a:avLst/>
@@ -5319,17 +6091,63 @@
             <a:pPr algn="l"/>
             <a:r>
               <a:rPr lang="en-US" sz="1200" dirty="0"/>
-              <a:t>parseIndex</a:t>
-            </a:r>
-          </a:p>
-        </p:txBody>
-      </p:sp>
-      <p:sp>
-        <p:nvSpPr>
-          <p:cNvPr id="75" name="TextBox 74">
-            <a:extLst>
-              <a:ext uri="{FF2B5EF4-FFF2-40B4-BE49-F238E27FC236}">
-                <a16:creationId xmlns:a16="http://schemas.microsoft.com/office/drawing/2014/main" id="{905ADEEF-71D5-4BC2-AF4B-41E95D0708F8}"/>
+              <a:t>parseTheaters(3)</a:t>
+            </a:r>
+          </a:p>
+        </p:txBody>
+      </p:sp>
+      <p:cxnSp>
+        <p:nvCxnSpPr>
+          <p:cNvPr id="95" name="Straight Arrow Connector 94">
+            <a:extLst>
+              <a:ext uri="{FF2B5EF4-FFF2-40B4-BE49-F238E27FC236}">
+                <a16:creationId xmlns:a16="http://schemas.microsoft.com/office/drawing/2014/main" id="{1D76B350-FAC4-4356-821B-E211463AD7FA}"/>
+              </a:ext>
+            </a:extLst>
+          </p:cNvPr>
+          <p:cNvCxnSpPr>
+            <a:cxnSpLocks/>
+          </p:cNvCxnSpPr>
+          <p:nvPr/>
+        </p:nvCxnSpPr>
+        <p:spPr>
+          <a:xfrm flipV="1">
+            <a:off x="5758178" y="3304083"/>
+            <a:ext cx="2598497" cy="7732"/>
+          </a:xfrm>
+          <a:prstGeom prst="straightConnector1">
+            <a:avLst/>
+          </a:prstGeom>
+          <a:ln w="19050">
+            <a:solidFill>
+              <a:schemeClr val="accent1"/>
+            </a:solidFill>
+            <a:prstDash val="sysDash"/>
+            <a:headEnd type="arrow" w="med" len="med"/>
+            <a:tailEnd type="none" w="med" len="med"/>
+          </a:ln>
+        </p:spPr>
+        <p:style>
+          <a:lnRef idx="1">
+            <a:schemeClr val="accent1"/>
+          </a:lnRef>
+          <a:fillRef idx="0">
+            <a:schemeClr val="accent1"/>
+          </a:fillRef>
+          <a:effectRef idx="0">
+            <a:schemeClr val="accent1"/>
+          </a:effectRef>
+          <a:fontRef idx="minor">
+            <a:schemeClr val="tx1"/>
+          </a:fontRef>
+        </p:style>
+      </p:cxnSp>
+      <p:sp>
+        <p:nvSpPr>
+          <p:cNvPr id="96" name="TextBox 95">
+            <a:extLst>
+              <a:ext uri="{FF2B5EF4-FFF2-40B4-BE49-F238E27FC236}">
+                <a16:creationId xmlns:a16="http://schemas.microsoft.com/office/drawing/2014/main" id="{3DA038E6-7CEF-429E-91A0-4F780680CE75}"/>
               </a:ext>
             </a:extLst>
           </p:cNvPr>
@@ -5338,7 +6156,7 @@
         </p:nvSpPr>
         <p:spPr>
           <a:xfrm>
-            <a:off x="7988402" y="3344350"/>
+            <a:off x="7549133" y="3325179"/>
             <a:ext cx="1028419" cy="184666"/>
           </a:xfrm>
           <a:prstGeom prst="rect">
@@ -5366,17 +6184,17 @@
             <a:pPr algn="l"/>
             <a:r>
               <a:rPr lang="en-US" sz="1200" dirty="0"/>
-              <a:t>index</a:t>
+              <a:t>newTheaters</a:t>
             </a:r>
           </a:p>
         </p:txBody>
       </p:sp>
       <p:cxnSp>
         <p:nvCxnSpPr>
-          <p:cNvPr id="83" name="Straight Arrow Connector 82">
-            <a:extLst>
-              <a:ext uri="{FF2B5EF4-FFF2-40B4-BE49-F238E27FC236}">
-                <a16:creationId xmlns:a16="http://schemas.microsoft.com/office/drawing/2014/main" id="{4A186F8E-335A-4596-89DD-C6E405C2FC55}"/>
+          <p:cNvPr id="109" name="Straight Connector 108">
+            <a:extLst>
+              <a:ext uri="{FF2B5EF4-FFF2-40B4-BE49-F238E27FC236}">
+                <a16:creationId xmlns:a16="http://schemas.microsoft.com/office/drawing/2014/main" id="{BCC6A046-A63A-4A08-89A6-E8A1392E09BB}"/>
               </a:ext>
             </a:extLst>
           </p:cNvPr>
@@ -5386,94 +6204,134 @@
           <p:nvPr/>
         </p:nvCxnSpPr>
         <p:spPr>
-          <a:xfrm>
-            <a:off x="6128789" y="3927067"/>
-            <a:ext cx="2252043" cy="0"/>
-          </a:xfrm>
-          <a:prstGeom prst="straightConnector1">
+          <a:xfrm flipH="1">
+            <a:off x="5644709" y="1769396"/>
+            <a:ext cx="10671" cy="3075654"/>
+          </a:xfrm>
+          <a:prstGeom prst="line">
             <a:avLst/>
           </a:prstGeom>
           <a:ln w="19050">
             <a:solidFill>
               <a:srgbClr val="0070C0"/>
             </a:solidFill>
-            <a:tailEnd type="arrow"/>
+            <a:prstDash val="sysDash"/>
           </a:ln>
+          <a:effectLst/>
         </p:spPr>
         <p:style>
           <a:lnRef idx="1">
             <a:schemeClr val="accent1"/>
           </a:lnRef>
-          <a:fillRef idx="0">
-            <a:schemeClr val="accent1"/>
-          </a:fillRef>
-          <a:effectRef idx="0">
-            <a:schemeClr val="accent1"/>
-          </a:effectRef>
-          <a:fontRef idx="minor">
-            <a:schemeClr val="tx1"/>
-          </a:fontRef>
-        </p:style>
-      </p:cxnSp>
-      <p:sp>
-        <p:nvSpPr>
-          <p:cNvPr id="84" name="Rectangle 83">
-            <a:extLst>
-              <a:ext uri="{FF2B5EF4-FFF2-40B4-BE49-F238E27FC236}">
-                <a16:creationId xmlns:a16="http://schemas.microsoft.com/office/drawing/2014/main" id="{AA45F2ED-189C-4035-BA40-7B1260D59C50}"/>
-              </a:ext>
-            </a:extLst>
-          </p:cNvPr>
-          <p:cNvSpPr/>
-          <p:nvPr/>
-        </p:nvSpPr>
-        <p:spPr>
-          <a:xfrm>
-            <a:off x="8364284" y="3927464"/>
-            <a:ext cx="170852" cy="247784"/>
-          </a:xfrm>
-          <a:prstGeom prst="rect">
-            <a:avLst/>
-          </a:prstGeom>
-          <a:solidFill>
-            <a:srgbClr val="0070C0"/>
-          </a:solidFill>
-          <a:ln>
-            <a:solidFill>
-              <a:srgbClr val="0070C0"/>
-            </a:solidFill>
-          </a:ln>
-          <a:effectLst/>
-        </p:spPr>
-        <p:style>
-          <a:lnRef idx="1">
-            <a:schemeClr val="accent3"/>
-          </a:lnRef>
           <a:fillRef idx="2">
-            <a:schemeClr val="accent3"/>
+            <a:schemeClr val="accent1"/>
           </a:fillRef>
           <a:effectRef idx="1">
-            <a:schemeClr val="accent3"/>
+            <a:schemeClr val="accent1"/>
           </a:effectRef>
           <a:fontRef idx="minor">
             <a:schemeClr val="dk1"/>
           </a:fontRef>
         </p:style>
+      </p:cxnSp>
+      <p:cxnSp>
+        <p:nvCxnSpPr>
+          <p:cNvPr id="114" name="Straight Connector 113">
+            <a:extLst>
+              <a:ext uri="{FF2B5EF4-FFF2-40B4-BE49-F238E27FC236}">
+                <a16:creationId xmlns:a16="http://schemas.microsoft.com/office/drawing/2014/main" id="{93A2F898-572C-4CFE-B1B2-2499C8B09022}"/>
+              </a:ext>
+            </a:extLst>
+          </p:cNvPr>
+          <p:cNvCxnSpPr>
+            <a:cxnSpLocks/>
+            <a:endCxn id="110" idx="2"/>
+          </p:cNvCxnSpPr>
+          <p:nvPr/>
+        </p:nvCxnSpPr>
+        <p:spPr>
+          <a:xfrm flipH="1">
+            <a:off x="9540330" y="3979001"/>
+            <a:ext cx="7442" cy="2530928"/>
+          </a:xfrm>
+          <a:prstGeom prst="line">
+            <a:avLst/>
+          </a:prstGeom>
+          <a:ln w="19050">
+            <a:solidFill>
+              <a:srgbClr val="0070C0"/>
+            </a:solidFill>
+            <a:prstDash val="sysDash"/>
+          </a:ln>
+          <a:effectLst/>
+        </p:spPr>
+        <p:style>
+          <a:lnRef idx="1">
+            <a:schemeClr val="accent1"/>
+          </a:lnRef>
+          <a:fillRef idx="2">
+            <a:schemeClr val="accent1"/>
+          </a:fillRef>
+          <a:effectRef idx="1">
+            <a:schemeClr val="accent1"/>
+          </a:effectRef>
+          <a:fontRef idx="minor">
+            <a:schemeClr val="dk1"/>
+          </a:fontRef>
+        </p:style>
+      </p:cxnSp>
+      <p:sp>
+        <p:nvSpPr>
+          <p:cNvPr id="49" name="Rectangle 48">
+            <a:extLst>
+              <a:ext uri="{FF2B5EF4-FFF2-40B4-BE49-F238E27FC236}">
+                <a16:creationId xmlns:a16="http://schemas.microsoft.com/office/drawing/2014/main" id="{BD86AB15-2BA6-4FC3-AEAE-5C9E3B27A9BC}"/>
+              </a:ext>
+            </a:extLst>
+          </p:cNvPr>
+          <p:cNvSpPr/>
+          <p:nvPr/>
+        </p:nvSpPr>
+        <p:spPr>
+          <a:xfrm>
+            <a:off x="5704891" y="1545933"/>
+            <a:ext cx="154278" cy="133348"/>
+          </a:xfrm>
+          <a:prstGeom prst="rect">
+            <a:avLst/>
+          </a:prstGeom>
+          <a:noFill/>
+          <a:ln/>
+        </p:spPr>
+        <p:style>
+          <a:lnRef idx="2">
+            <a:schemeClr val="accent1"/>
+          </a:lnRef>
+          <a:fillRef idx="1">
+            <a:schemeClr val="lt1"/>
+          </a:fillRef>
+          <a:effectRef idx="0">
+            <a:schemeClr val="accent1"/>
+          </a:effectRef>
+          <a:fontRef idx="minor">
+            <a:schemeClr val="dk1"/>
+          </a:fontRef>
+        </p:style>
         <p:txBody>
           <a:bodyPr rtlCol="0" anchor="ctr"/>
           <a:lstStyle/>
           <a:p>
             <a:pPr algn="ctr"/>
-            <a:endParaRPr lang="en-SG" sz="1200" dirty="0"/>
-          </a:p>
-        </p:txBody>
-      </p:sp>
-      <p:sp>
-        <p:nvSpPr>
-          <p:cNvPr id="85" name="TextBox 84">
-            <a:extLst>
-              <a:ext uri="{FF2B5EF4-FFF2-40B4-BE49-F238E27FC236}">
-                <a16:creationId xmlns:a16="http://schemas.microsoft.com/office/drawing/2014/main" id="{B5D68205-2ABF-4CBF-ABDF-113F077A16AB}"/>
+            <a:endParaRPr lang="en-SG" sz="1401" dirty="0"/>
+          </a:p>
+        </p:txBody>
+      </p:sp>
+      <p:sp>
+        <p:nvSpPr>
+          <p:cNvPr id="59" name="TextBox 58">
+            <a:extLst>
+              <a:ext uri="{FF2B5EF4-FFF2-40B4-BE49-F238E27FC236}">
+                <a16:creationId xmlns:a16="http://schemas.microsoft.com/office/drawing/2014/main" id="{68970A61-4DB6-49C7-8952-1AA20B3441B2}"/>
               </a:ext>
             </a:extLst>
           </p:cNvPr>
@@ -5482,8 +6340,8 @@
         </p:nvSpPr>
         <p:spPr>
           <a:xfrm>
-            <a:off x="6198005" y="3697293"/>
-            <a:ext cx="1028419" cy="184666"/>
+            <a:off x="5612564" y="1555495"/>
+            <a:ext cx="1424330" cy="169277"/>
           </a:xfrm>
           <a:prstGeom prst="rect">
             <a:avLst/>
@@ -5507,20 +6365,19 @@
             </a:lvl1pPr>
           </a:lstStyle>
           <a:p>
-            <a:pPr algn="l"/>
-            <a:r>
-              <a:rPr lang="en-US" sz="1200" dirty="0"/>
-              <a:t>parseTheaters</a:t>
+            <a:r>
+              <a:rPr lang="en-US" sz="1100" dirty="0"/>
+              <a:t>arePrefixesPresent()</a:t>
             </a:r>
           </a:p>
         </p:txBody>
       </p:sp>
       <p:cxnSp>
         <p:nvCxnSpPr>
-          <p:cNvPr id="95" name="Straight Arrow Connector 94">
-            <a:extLst>
-              <a:ext uri="{FF2B5EF4-FFF2-40B4-BE49-F238E27FC236}">
-                <a16:creationId xmlns:a16="http://schemas.microsoft.com/office/drawing/2014/main" id="{1D76B350-FAC4-4356-821B-E211463AD7FA}"/>
+          <p:cNvPr id="68" name="Connector: Curved 67">
+            <a:extLst>
+              <a:ext uri="{FF2B5EF4-FFF2-40B4-BE49-F238E27FC236}">
+                <a16:creationId xmlns:a16="http://schemas.microsoft.com/office/drawing/2014/main" id="{8D8E7528-4D67-4443-950B-6D760AF2CA1D}"/>
               </a:ext>
             </a:extLst>
           </p:cNvPr>
@@ -5530,30 +6387,28 @@
           <p:nvPr/>
         </p:nvCxnSpPr>
         <p:spPr>
-          <a:xfrm>
-            <a:off x="6099693" y="4157231"/>
-            <a:ext cx="2277142" cy="2535"/>
-          </a:xfrm>
-          <a:prstGeom prst="straightConnector1">
-            <a:avLst/>
+          <a:xfrm rot="16200000" flipH="1">
+            <a:off x="5778869" y="1529190"/>
+            <a:ext cx="86832" cy="93562"/>
+          </a:xfrm>
+          <a:prstGeom prst="curvedConnector4">
+            <a:avLst>
+              <a:gd name="adj1" fmla="val -47535"/>
+              <a:gd name="adj2" fmla="val 175505"/>
+            </a:avLst>
           </a:prstGeom>
-          <a:ln w="19050">
-            <a:solidFill>
-              <a:schemeClr val="accent1"/>
-            </a:solidFill>
-            <a:prstDash val="sysDash"/>
-            <a:headEnd type="arrow" w="med" len="med"/>
-            <a:tailEnd type="none" w="med" len="med"/>
+          <a:ln>
+            <a:tailEnd type="triangle"/>
           </a:ln>
         </p:spPr>
         <p:style>
-          <a:lnRef idx="1">
+          <a:lnRef idx="2">
             <a:schemeClr val="accent1"/>
           </a:lnRef>
           <a:fillRef idx="0">
             <a:schemeClr val="accent1"/>
           </a:fillRef>
-          <a:effectRef idx="0">
+          <a:effectRef idx="1">
             <a:schemeClr val="accent1"/>
           </a:effectRef>
           <a:fontRef idx="minor">
@@ -5561,12 +6416,51 @@
           </a:fontRef>
         </p:style>
       </p:cxnSp>
-      <p:sp>
-        <p:nvSpPr>
-          <p:cNvPr id="96" name="TextBox 95">
-            <a:extLst>
-              <a:ext uri="{FF2B5EF4-FFF2-40B4-BE49-F238E27FC236}">
-                <a16:creationId xmlns:a16="http://schemas.microsoft.com/office/drawing/2014/main" id="{3DA038E6-7CEF-429E-91A0-4F780680CE75}"/>
+      <p:pic>
+        <p:nvPicPr>
+          <p:cNvPr id="79" name="Graphic 78" descr="Close">
+            <a:extLst>
+              <a:ext uri="{FF2B5EF4-FFF2-40B4-BE49-F238E27FC236}">
+                <a16:creationId xmlns:a16="http://schemas.microsoft.com/office/drawing/2014/main" id="{ECB334F2-0182-4A03-887E-1D898983D35C}"/>
+              </a:ext>
+            </a:extLst>
+          </p:cNvPr>
+          <p:cNvPicPr>
+            <a:picLocks noChangeAspect="1"/>
+          </p:cNvPicPr>
+          <p:nvPr/>
+        </p:nvPicPr>
+        <p:blipFill>
+          <a:blip r:embed="rId2">
+            <a:extLst>
+              <a:ext uri="{28A0092B-C50C-407E-A947-70E740481C1C}">
+                <a14:useLocalDpi xmlns:a14="http://schemas.microsoft.com/office/drawing/2010/main" val="0"/>
+              </a:ext>
+              <a:ext uri="{96DAC541-7B7A-43D3-8B79-37D633B846F1}">
+                <asvg:svgBlip xmlns:asvg="http://schemas.microsoft.com/office/drawing/2016/SVG/main" r:embed="rId3"/>
+              </a:ext>
+            </a:extLst>
+          </a:blip>
+          <a:stretch>
+            <a:fillRect/>
+          </a:stretch>
+        </p:blipFill>
+        <p:spPr>
+          <a:xfrm>
+            <a:off x="5552784" y="4790264"/>
+            <a:ext cx="184666" cy="184666"/>
+          </a:xfrm>
+          <a:prstGeom prst="rect">
+            <a:avLst/>
+          </a:prstGeom>
+        </p:spPr>
+      </p:pic>
+      <p:sp>
+        <p:nvSpPr>
+          <p:cNvPr id="102" name="TextBox 101">
+            <a:extLst>
+              <a:ext uri="{FF2B5EF4-FFF2-40B4-BE49-F238E27FC236}">
+                <a16:creationId xmlns:a16="http://schemas.microsoft.com/office/drawing/2014/main" id="{7166E1D7-74AE-4AE4-8353-AF907949FDD5}"/>
               </a:ext>
             </a:extLst>
           </p:cNvPr>
@@ -5575,8 +6469,235 @@
         </p:nvSpPr>
         <p:spPr>
           <a:xfrm>
-            <a:off x="7528296" y="4185479"/>
-            <a:ext cx="1028419" cy="184666"/>
+            <a:off x="1019348" y="4863055"/>
+            <a:ext cx="1819074" cy="184666"/>
+          </a:xfrm>
+          <a:prstGeom prst="rect">
+            <a:avLst/>
+          </a:prstGeom>
+          <a:noFill/>
+        </p:spPr>
+        <p:txBody>
+          <a:bodyPr wrap="square" lIns="0" tIns="0" rIns="0" bIns="0" rtlCol="0">
+            <a:spAutoFit/>
+          </a:bodyPr>
+          <a:lstStyle/>
+          <a:p>
+            <a:pPr algn="r"/>
+            <a:r>
+              <a:rPr lang="en-US" sz="1200" dirty="0">
+                <a:solidFill>
+                  <a:srgbClr val="0070C0"/>
+                </a:solidFill>
+              </a:rPr>
+              <a:t>execute()</a:t>
+            </a:r>
+          </a:p>
+        </p:txBody>
+      </p:sp>
+      <p:cxnSp>
+        <p:nvCxnSpPr>
+          <p:cNvPr id="105" name="Straight Arrow Connector 104">
+            <a:extLst>
+              <a:ext uri="{FF2B5EF4-FFF2-40B4-BE49-F238E27FC236}">
+                <a16:creationId xmlns:a16="http://schemas.microsoft.com/office/drawing/2014/main" id="{AAF9DE7B-E32C-4E9E-BE74-D3FDBFC45FFA}"/>
+              </a:ext>
+            </a:extLst>
+          </p:cNvPr>
+          <p:cNvCxnSpPr>
+            <a:cxnSpLocks/>
+          </p:cNvCxnSpPr>
+          <p:nvPr/>
+        </p:nvCxnSpPr>
+        <p:spPr>
+          <a:xfrm>
+            <a:off x="2024367" y="5069491"/>
+            <a:ext cx="7423311" cy="41768"/>
+          </a:xfrm>
+          <a:prstGeom prst="straightConnector1">
+            <a:avLst/>
+          </a:prstGeom>
+          <a:ln w="19050">
+            <a:solidFill>
+              <a:srgbClr val="0070C0"/>
+            </a:solidFill>
+            <a:tailEnd type="arrow"/>
+          </a:ln>
+        </p:spPr>
+        <p:style>
+          <a:lnRef idx="1">
+            <a:schemeClr val="accent1"/>
+          </a:lnRef>
+          <a:fillRef idx="0">
+            <a:schemeClr val="accent1"/>
+          </a:fillRef>
+          <a:effectRef idx="0">
+            <a:schemeClr val="accent1"/>
+          </a:effectRef>
+          <a:fontRef idx="minor">
+            <a:schemeClr val="tx1"/>
+          </a:fontRef>
+        </p:style>
+      </p:cxnSp>
+      <p:sp>
+        <p:nvSpPr>
+          <p:cNvPr id="110" name="Rectangle 109">
+            <a:extLst>
+              <a:ext uri="{FF2B5EF4-FFF2-40B4-BE49-F238E27FC236}">
+                <a16:creationId xmlns:a16="http://schemas.microsoft.com/office/drawing/2014/main" id="{C5D222E7-17A8-4BC7-AA22-1083058FF590}"/>
+              </a:ext>
+            </a:extLst>
+          </p:cNvPr>
+          <p:cNvSpPr/>
+          <p:nvPr/>
+        </p:nvSpPr>
+        <p:spPr>
+          <a:xfrm flipH="1">
+            <a:off x="9459137" y="5078612"/>
+            <a:ext cx="162386" cy="1431317"/>
+          </a:xfrm>
+          <a:prstGeom prst="rect">
+            <a:avLst/>
+          </a:prstGeom>
+          <a:solidFill>
+            <a:srgbClr val="0070C0"/>
+          </a:solidFill>
+          <a:ln>
+            <a:solidFill>
+              <a:srgbClr val="0070C0"/>
+            </a:solidFill>
+          </a:ln>
+          <a:effectLst/>
+        </p:spPr>
+        <p:style>
+          <a:lnRef idx="1">
+            <a:schemeClr val="accent3"/>
+          </a:lnRef>
+          <a:fillRef idx="2">
+            <a:schemeClr val="accent3"/>
+          </a:fillRef>
+          <a:effectRef idx="1">
+            <a:schemeClr val="accent3"/>
+          </a:effectRef>
+          <a:fontRef idx="minor">
+            <a:schemeClr val="dk1"/>
+          </a:fontRef>
+        </p:style>
+        <p:txBody>
+          <a:bodyPr rtlCol="0" anchor="ctr"/>
+          <a:lstStyle/>
+          <a:p>
+            <a:pPr algn="ctr"/>
+            <a:endParaRPr lang="en-SG" sz="1200" dirty="0"/>
+          </a:p>
+        </p:txBody>
+      </p:sp>
+      <p:sp>
+        <p:nvSpPr>
+          <p:cNvPr id="111" name="Rectangle 110">
+            <a:extLst>
+              <a:ext uri="{FF2B5EF4-FFF2-40B4-BE49-F238E27FC236}">
+                <a16:creationId xmlns:a16="http://schemas.microsoft.com/office/drawing/2014/main" id="{EBA2BB42-913D-47D5-9E0F-582D09A20646}"/>
+              </a:ext>
+            </a:extLst>
+          </p:cNvPr>
+          <p:cNvSpPr/>
+          <p:nvPr/>
+        </p:nvSpPr>
+        <p:spPr>
+          <a:xfrm>
+            <a:off x="9588950" y="5138977"/>
+            <a:ext cx="154278" cy="133348"/>
+          </a:xfrm>
+          <a:prstGeom prst="rect">
+            <a:avLst/>
+          </a:prstGeom>
+          <a:noFill/>
+          <a:ln/>
+        </p:spPr>
+        <p:style>
+          <a:lnRef idx="2">
+            <a:schemeClr val="accent1"/>
+          </a:lnRef>
+          <a:fillRef idx="1">
+            <a:schemeClr val="lt1"/>
+          </a:fillRef>
+          <a:effectRef idx="0">
+            <a:schemeClr val="accent1"/>
+          </a:effectRef>
+          <a:fontRef idx="minor">
+            <a:schemeClr val="dk1"/>
+          </a:fontRef>
+        </p:style>
+        <p:txBody>
+          <a:bodyPr rtlCol="0" anchor="ctr"/>
+          <a:lstStyle/>
+          <a:p>
+            <a:pPr algn="ctr"/>
+            <a:endParaRPr lang="en-SG" sz="1401" dirty="0"/>
+          </a:p>
+        </p:txBody>
+      </p:sp>
+      <p:cxnSp>
+        <p:nvCxnSpPr>
+          <p:cNvPr id="112" name="Connector: Curved 111">
+            <a:extLst>
+              <a:ext uri="{FF2B5EF4-FFF2-40B4-BE49-F238E27FC236}">
+                <a16:creationId xmlns:a16="http://schemas.microsoft.com/office/drawing/2014/main" id="{AEFD51E4-A910-47A6-B718-4FD241D93469}"/>
+              </a:ext>
+            </a:extLst>
+          </p:cNvPr>
+          <p:cNvCxnSpPr>
+            <a:cxnSpLocks/>
+          </p:cNvCxnSpPr>
+          <p:nvPr/>
+        </p:nvCxnSpPr>
+        <p:spPr>
+          <a:xfrm rot="16200000" flipH="1">
+            <a:off x="9665661" y="5119647"/>
+            <a:ext cx="86832" cy="93562"/>
+          </a:xfrm>
+          <a:prstGeom prst="curvedConnector4">
+            <a:avLst>
+              <a:gd name="adj1" fmla="val -47535"/>
+              <a:gd name="adj2" fmla="val 175505"/>
+            </a:avLst>
+          </a:prstGeom>
+          <a:ln>
+            <a:tailEnd type="triangle"/>
+          </a:ln>
+        </p:spPr>
+        <p:style>
+          <a:lnRef idx="2">
+            <a:schemeClr val="accent1"/>
+          </a:lnRef>
+          <a:fillRef idx="0">
+            <a:schemeClr val="accent1"/>
+          </a:fillRef>
+          <a:effectRef idx="1">
+            <a:schemeClr val="accent1"/>
+          </a:effectRef>
+          <a:fontRef idx="minor">
+            <a:schemeClr val="tx1"/>
+          </a:fontRef>
+        </p:style>
+      </p:cxnSp>
+      <p:sp>
+        <p:nvSpPr>
+          <p:cNvPr id="113" name="TextBox 112">
+            <a:extLst>
+              <a:ext uri="{FF2B5EF4-FFF2-40B4-BE49-F238E27FC236}">
+                <a16:creationId xmlns:a16="http://schemas.microsoft.com/office/drawing/2014/main" id="{3E9B4045-E8F0-4217-8F9B-2C9AFF9CC06F}"/>
+              </a:ext>
+            </a:extLst>
+          </p:cNvPr>
+          <p:cNvSpPr txBox="1"/>
+          <p:nvPr/>
+        </p:nvSpPr>
+        <p:spPr>
+          <a:xfrm>
+            <a:off x="9839144" y="5047721"/>
+            <a:ext cx="1413423" cy="184666"/>
           </a:xfrm>
           <a:prstGeom prst="rect">
             <a:avLst/>
@@ -5600,20 +6721,19 @@
             </a:lvl1pPr>
           </a:lstStyle>
           <a:p>
-            <a:pPr algn="l"/>
             <a:r>
               <a:rPr lang="en-US" sz="1200" dirty="0"/>
-              <a:t>newTheaters</a:t>
+              <a:t>createResizedCinema()</a:t>
             </a:r>
           </a:p>
         </p:txBody>
       </p:sp>
       <p:cxnSp>
         <p:nvCxnSpPr>
-          <p:cNvPr id="109" name="Straight Connector 108">
-            <a:extLst>
-              <a:ext uri="{FF2B5EF4-FFF2-40B4-BE49-F238E27FC236}">
-                <a16:creationId xmlns:a16="http://schemas.microsoft.com/office/drawing/2014/main" id="{BCC6A046-A63A-4A08-89A6-E8A1392E09BB}"/>
+          <p:cNvPr id="116" name="Straight Arrow Connector 115">
+            <a:extLst>
+              <a:ext uri="{FF2B5EF4-FFF2-40B4-BE49-F238E27FC236}">
+                <a16:creationId xmlns:a16="http://schemas.microsoft.com/office/drawing/2014/main" id="{9F9DC763-5E18-4F1C-8D97-E266E1241347}"/>
               </a:ext>
             </a:extLst>
           </p:cNvPr>
@@ -5623,17 +6743,170 @@
           <p:nvPr/>
         </p:nvCxnSpPr>
         <p:spPr>
-          <a:xfrm flipH="1">
-            <a:off x="5995008" y="2480493"/>
-            <a:ext cx="1" cy="3507133"/>
-          </a:xfrm>
-          <a:prstGeom prst="line">
+          <a:xfrm flipV="1">
+            <a:off x="9624342" y="5474633"/>
+            <a:ext cx="1918116" cy="21987"/>
+          </a:xfrm>
+          <a:prstGeom prst="straightConnector1">
             <a:avLst/>
           </a:prstGeom>
           <a:ln w="19050">
             <a:solidFill>
               <a:srgbClr val="0070C0"/>
             </a:solidFill>
+            <a:tailEnd type="arrow"/>
+          </a:ln>
+        </p:spPr>
+        <p:style>
+          <a:lnRef idx="1">
+            <a:schemeClr val="accent1"/>
+          </a:lnRef>
+          <a:fillRef idx="0">
+            <a:schemeClr val="accent1"/>
+          </a:fillRef>
+          <a:effectRef idx="0">
+            <a:schemeClr val="accent1"/>
+          </a:effectRef>
+          <a:fontRef idx="minor">
+            <a:schemeClr val="tx1"/>
+          </a:fontRef>
+        </p:style>
+      </p:cxnSp>
+      <p:sp>
+        <p:nvSpPr>
+          <p:cNvPr id="117" name="TextBox 116">
+            <a:extLst>
+              <a:ext uri="{FF2B5EF4-FFF2-40B4-BE49-F238E27FC236}">
+                <a16:creationId xmlns:a16="http://schemas.microsoft.com/office/drawing/2014/main" id="{16AF24CA-9189-417E-9E6D-4C66BD2DBF5C}"/>
+              </a:ext>
+            </a:extLst>
+          </p:cNvPr>
+          <p:cNvSpPr txBox="1"/>
+          <p:nvPr/>
+        </p:nvSpPr>
+        <p:spPr>
+          <a:xfrm>
+            <a:off x="9552963" y="5307010"/>
+            <a:ext cx="1775797" cy="184666"/>
+          </a:xfrm>
+          <a:prstGeom prst="rect">
+            <a:avLst/>
+          </a:prstGeom>
+          <a:noFill/>
+        </p:spPr>
+        <p:txBody>
+          <a:bodyPr wrap="square" lIns="0" tIns="0" rIns="0" bIns="0" rtlCol="0">
+            <a:spAutoFit/>
+          </a:bodyPr>
+          <a:lstStyle>
+            <a:defPPr>
+              <a:defRPr lang="en-US"/>
+            </a:defPPr>
+            <a:lvl1pPr algn="r">
+              <a:defRPr sz="1400">
+                <a:solidFill>
+                  <a:srgbClr val="0070C0"/>
+                </a:solidFill>
+              </a:defRPr>
+            </a:lvl1pPr>
+          </a:lstStyle>
+          <a:p>
+            <a:r>
+              <a:rPr lang="en-US" sz="1200" dirty="0"/>
+              <a:t>updateCinema(old, new)</a:t>
+            </a:r>
+          </a:p>
+        </p:txBody>
+      </p:sp>
+      <p:sp>
+        <p:nvSpPr>
+          <p:cNvPr id="121" name="Rectangle 62">
+            <a:extLst>
+              <a:ext uri="{FF2B5EF4-FFF2-40B4-BE49-F238E27FC236}">
+                <a16:creationId xmlns:a16="http://schemas.microsoft.com/office/drawing/2014/main" id="{38D74202-775C-4709-AC5A-A6546C880D83}"/>
+              </a:ext>
+            </a:extLst>
+          </p:cNvPr>
+          <p:cNvSpPr/>
+          <p:nvPr/>
+        </p:nvSpPr>
+        <p:spPr>
+          <a:xfrm>
+            <a:off x="11279318" y="4707011"/>
+            <a:ext cx="680094" cy="312088"/>
+          </a:xfrm>
+          <a:prstGeom prst="rect">
+            <a:avLst/>
+          </a:prstGeom>
+          <a:solidFill>
+            <a:srgbClr val="7030A0"/>
+          </a:solidFill>
+          <a:ln w="19050">
+            <a:solidFill>
+              <a:srgbClr val="7030A0"/>
+            </a:solidFill>
+          </a:ln>
+          <a:effectLst/>
+        </p:spPr>
+        <p:style>
+          <a:lnRef idx="1">
+            <a:schemeClr val="accent2"/>
+          </a:lnRef>
+          <a:fillRef idx="2">
+            <a:schemeClr val="accent2"/>
+          </a:fillRef>
+          <a:effectRef idx="1">
+            <a:schemeClr val="accent2"/>
+          </a:effectRef>
+          <a:fontRef idx="minor">
+            <a:schemeClr val="dk1"/>
+          </a:fontRef>
+        </p:style>
+        <p:txBody>
+          <a:bodyPr rtlCol="0" anchor="ctr"/>
+          <a:lstStyle/>
+          <a:p>
+            <a:pPr algn="ctr"/>
+            <a:r>
+              <a:rPr lang="en-US" sz="1200" dirty="0">
+                <a:solidFill>
+                  <a:schemeClr val="bg1"/>
+                </a:solidFill>
+              </a:rPr>
+              <a:t>:Model</a:t>
+            </a:r>
+            <a:endParaRPr lang="en-SG" sz="1200" dirty="0">
+              <a:solidFill>
+                <a:schemeClr val="bg1"/>
+              </a:solidFill>
+            </a:endParaRPr>
+          </a:p>
+        </p:txBody>
+      </p:sp>
+      <p:cxnSp>
+        <p:nvCxnSpPr>
+          <p:cNvPr id="122" name="Straight Connector 121">
+            <a:extLst>
+              <a:ext uri="{FF2B5EF4-FFF2-40B4-BE49-F238E27FC236}">
+                <a16:creationId xmlns:a16="http://schemas.microsoft.com/office/drawing/2014/main" id="{1C363E33-79CD-4F87-8CDF-2FD83182D400}"/>
+              </a:ext>
+            </a:extLst>
+          </p:cNvPr>
+          <p:cNvCxnSpPr/>
+          <p:nvPr/>
+        </p:nvCxnSpPr>
+        <p:spPr>
+          <a:xfrm>
+            <a:off x="11604325" y="4972889"/>
+            <a:ext cx="0" cy="1723059"/>
+          </a:xfrm>
+          <a:prstGeom prst="line">
+            <a:avLst/>
+          </a:prstGeom>
+          <a:ln w="19050">
+            <a:solidFill>
+              <a:srgbClr val="7030A0"/>
+            </a:solidFill>
             <a:prstDash val="sysDash"/>
           </a:ln>
           <a:effectLst/>
@@ -5653,12 +6926,69 @@
           </a:fontRef>
         </p:style>
       </p:cxnSp>
+      <p:sp>
+        <p:nvSpPr>
+          <p:cNvPr id="123" name="Rectangle 122">
+            <a:extLst>
+              <a:ext uri="{FF2B5EF4-FFF2-40B4-BE49-F238E27FC236}">
+                <a16:creationId xmlns:a16="http://schemas.microsoft.com/office/drawing/2014/main" id="{6B2FAF8A-0A93-41D2-B66F-E825698EE1FC}"/>
+              </a:ext>
+            </a:extLst>
+          </p:cNvPr>
+          <p:cNvSpPr/>
+          <p:nvPr/>
+        </p:nvSpPr>
+        <p:spPr>
+          <a:xfrm>
+            <a:off x="11544263" y="5463104"/>
+            <a:ext cx="120123" cy="342225"/>
+          </a:xfrm>
+          <a:prstGeom prst="rect">
+            <a:avLst/>
+          </a:prstGeom>
+          <a:solidFill>
+            <a:srgbClr val="7030A0"/>
+          </a:solidFill>
+          <a:ln>
+            <a:solidFill>
+              <a:srgbClr val="7030A0"/>
+            </a:solidFill>
+          </a:ln>
+          <a:effectLst/>
+        </p:spPr>
+        <p:style>
+          <a:lnRef idx="1">
+            <a:schemeClr val="accent3"/>
+          </a:lnRef>
+          <a:fillRef idx="2">
+            <a:schemeClr val="accent3"/>
+          </a:fillRef>
+          <a:effectRef idx="1">
+            <a:schemeClr val="accent3"/>
+          </a:effectRef>
+          <a:fontRef idx="minor">
+            <a:schemeClr val="dk1"/>
+          </a:fontRef>
+        </p:style>
+        <p:txBody>
+          <a:bodyPr rtlCol="0" anchor="ctr"/>
+          <a:lstStyle/>
+          <a:p>
+            <a:pPr algn="ctr"/>
+            <a:endParaRPr lang="en-SG" sz="1400" dirty="0">
+              <a:solidFill>
+                <a:schemeClr val="dk1"/>
+              </a:solidFill>
+            </a:endParaRPr>
+          </a:p>
+        </p:txBody>
+      </p:sp>
       <p:cxnSp>
         <p:nvCxnSpPr>
-          <p:cNvPr id="114" name="Straight Connector 113">
-            <a:extLst>
-              <a:ext uri="{FF2B5EF4-FFF2-40B4-BE49-F238E27FC236}">
-                <a16:creationId xmlns:a16="http://schemas.microsoft.com/office/drawing/2014/main" id="{93A2F898-572C-4CFE-B1B2-2499C8B09022}"/>
+          <p:cNvPr id="130" name="Straight Arrow Connector 129">
+            <a:extLst>
+              <a:ext uri="{FF2B5EF4-FFF2-40B4-BE49-F238E27FC236}">
+                <a16:creationId xmlns:a16="http://schemas.microsoft.com/office/drawing/2014/main" id="{E304CE50-9C18-438C-9354-3BA253BC7BA0}"/>
               </a:ext>
             </a:extLst>
           </p:cNvPr>
@@ -5668,36 +6998,348 @@
           <p:nvPr/>
         </p:nvCxnSpPr>
         <p:spPr>
-          <a:xfrm flipH="1">
-            <a:off x="9885588" y="5285196"/>
-            <a:ext cx="3" cy="598290"/>
-          </a:xfrm>
-          <a:prstGeom prst="line">
+          <a:xfrm>
+            <a:off x="9662296" y="5792629"/>
+            <a:ext cx="1918116" cy="0"/>
+          </a:xfrm>
+          <a:prstGeom prst="straightConnector1">
+            <a:avLst/>
+          </a:prstGeom>
+          <a:ln w="19050">
+            <a:solidFill>
+              <a:srgbClr val="7030A0"/>
+            </a:solidFill>
+            <a:prstDash val="sysDash"/>
+            <a:headEnd type="arrow" w="med" len="med"/>
+            <a:tailEnd type="none" w="med" len="med"/>
+          </a:ln>
+        </p:spPr>
+        <p:style>
+          <a:lnRef idx="1">
+            <a:schemeClr val="accent1"/>
+          </a:lnRef>
+          <a:fillRef idx="0">
+            <a:schemeClr val="accent1"/>
+          </a:fillRef>
+          <a:effectRef idx="0">
+            <a:schemeClr val="accent1"/>
+          </a:effectRef>
+          <a:fontRef idx="minor">
+            <a:schemeClr val="tx1"/>
+          </a:fontRef>
+        </p:style>
+      </p:cxnSp>
+      <p:cxnSp>
+        <p:nvCxnSpPr>
+          <p:cNvPr id="138" name="Straight Arrow Connector 137">
+            <a:extLst>
+              <a:ext uri="{FF2B5EF4-FFF2-40B4-BE49-F238E27FC236}">
+                <a16:creationId xmlns:a16="http://schemas.microsoft.com/office/drawing/2014/main" id="{6F175AD1-8796-4A4B-AF88-68843E20994C}"/>
+              </a:ext>
+            </a:extLst>
+          </p:cNvPr>
+          <p:cNvCxnSpPr>
+            <a:cxnSpLocks/>
+          </p:cNvCxnSpPr>
+          <p:nvPr/>
+        </p:nvCxnSpPr>
+        <p:spPr>
+          <a:xfrm>
+            <a:off x="9645495" y="6101028"/>
+            <a:ext cx="263713" cy="0"/>
+          </a:xfrm>
+          <a:prstGeom prst="straightConnector1">
             <a:avLst/>
           </a:prstGeom>
           <a:ln w="19050">
             <a:solidFill>
               <a:srgbClr val="0070C0"/>
             </a:solidFill>
-            <a:prstDash val="sysDash"/>
+            <a:tailEnd type="arrow"/>
+          </a:ln>
+        </p:spPr>
+        <p:style>
+          <a:lnRef idx="1">
+            <a:schemeClr val="accent1"/>
+          </a:lnRef>
+          <a:fillRef idx="0">
+            <a:schemeClr val="accent1"/>
+          </a:fillRef>
+          <a:effectRef idx="0">
+            <a:schemeClr val="accent1"/>
+          </a:effectRef>
+          <a:fontRef idx="minor">
+            <a:schemeClr val="tx1"/>
+          </a:fontRef>
+        </p:style>
+      </p:cxnSp>
+      <p:sp>
+        <p:nvSpPr>
+          <p:cNvPr id="141" name="Rectangle 62">
+            <a:extLst>
+              <a:ext uri="{FF2B5EF4-FFF2-40B4-BE49-F238E27FC236}">
+                <a16:creationId xmlns:a16="http://schemas.microsoft.com/office/drawing/2014/main" id="{8C91B7F5-8A58-4D83-80DD-668E8A126C34}"/>
+              </a:ext>
+            </a:extLst>
+          </p:cNvPr>
+          <p:cNvSpPr/>
+          <p:nvPr/>
+        </p:nvSpPr>
+        <p:spPr>
+          <a:xfrm>
+            <a:off x="9897088" y="5947210"/>
+            <a:ext cx="1265639" cy="346757"/>
+          </a:xfrm>
+          <a:prstGeom prst="rect">
+            <a:avLst/>
+          </a:prstGeom>
+          <a:solidFill>
+            <a:srgbClr val="0070C0"/>
+          </a:solidFill>
+          <a:ln w="19050">
+            <a:solidFill>
+              <a:srgbClr val="0070C0"/>
+            </a:solidFill>
           </a:ln>
           <a:effectLst/>
         </p:spPr>
         <p:style>
           <a:lnRef idx="1">
-            <a:schemeClr val="accent1"/>
+            <a:schemeClr val="accent2"/>
           </a:lnRef>
           <a:fillRef idx="2">
-            <a:schemeClr val="accent1"/>
+            <a:schemeClr val="accent2"/>
           </a:fillRef>
           <a:effectRef idx="1">
-            <a:schemeClr val="accent1"/>
+            <a:schemeClr val="accent2"/>
           </a:effectRef>
           <a:fontRef idx="minor">
             <a:schemeClr val="dk1"/>
           </a:fontRef>
         </p:style>
+        <p:txBody>
+          <a:bodyPr rtlCol="0" anchor="ctr"/>
+          <a:lstStyle/>
+          <a:p>
+            <a:pPr algn="ctr"/>
+            <a:r>
+              <a:rPr lang="en-US" sz="1200" dirty="0">
+                <a:solidFill>
+                  <a:schemeClr val="bg1"/>
+                </a:solidFill>
+              </a:rPr>
+              <a:t>result:</a:t>
+            </a:r>
+          </a:p>
+          <a:p>
+            <a:pPr algn="ctr"/>
+            <a:r>
+              <a:rPr lang="en-US" sz="1200" dirty="0">
+                <a:solidFill>
+                  <a:schemeClr val="bg1"/>
+                </a:solidFill>
+              </a:rPr>
+              <a:t>CommandResult</a:t>
+            </a:r>
+            <a:endParaRPr lang="en-SG" sz="1200" dirty="0">
+              <a:solidFill>
+                <a:schemeClr val="bg1"/>
+              </a:solidFill>
+            </a:endParaRPr>
+          </a:p>
+        </p:txBody>
+      </p:sp>
+      <p:sp>
+        <p:nvSpPr>
+          <p:cNvPr id="142" name="Rectangle 141">
+            <a:extLst>
+              <a:ext uri="{FF2B5EF4-FFF2-40B4-BE49-F238E27FC236}">
+                <a16:creationId xmlns:a16="http://schemas.microsoft.com/office/drawing/2014/main" id="{B586E416-EE6E-4E8F-BB00-197F10C77087}"/>
+              </a:ext>
+            </a:extLst>
+          </p:cNvPr>
+          <p:cNvSpPr/>
+          <p:nvPr/>
+        </p:nvSpPr>
+        <p:spPr>
+          <a:xfrm flipH="1">
+            <a:off x="10419893" y="6291567"/>
+            <a:ext cx="195459" cy="169680"/>
+          </a:xfrm>
+          <a:prstGeom prst="rect">
+            <a:avLst/>
+          </a:prstGeom>
+          <a:solidFill>
+            <a:srgbClr val="0070C0"/>
+          </a:solidFill>
+          <a:ln>
+            <a:solidFill>
+              <a:srgbClr val="0070C0"/>
+            </a:solidFill>
+          </a:ln>
+          <a:effectLst/>
+        </p:spPr>
+        <p:style>
+          <a:lnRef idx="1">
+            <a:schemeClr val="accent3"/>
+          </a:lnRef>
+          <a:fillRef idx="2">
+            <a:schemeClr val="accent3"/>
+          </a:fillRef>
+          <a:effectRef idx="1">
+            <a:schemeClr val="accent3"/>
+          </a:effectRef>
+          <a:fontRef idx="minor">
+            <a:schemeClr val="dk1"/>
+          </a:fontRef>
+        </p:style>
+        <p:txBody>
+          <a:bodyPr rtlCol="0" anchor="ctr"/>
+          <a:lstStyle/>
+          <a:p>
+            <a:pPr algn="ctr"/>
+            <a:endParaRPr lang="en-SG" sz="1200" dirty="0"/>
+          </a:p>
+        </p:txBody>
+      </p:sp>
+      <p:cxnSp>
+        <p:nvCxnSpPr>
+          <p:cNvPr id="144" name="Straight Arrow Connector 143">
+            <a:extLst>
+              <a:ext uri="{FF2B5EF4-FFF2-40B4-BE49-F238E27FC236}">
+                <a16:creationId xmlns:a16="http://schemas.microsoft.com/office/drawing/2014/main" id="{BDA80BDD-6559-46F1-ACBE-0A59A712E3DD}"/>
+              </a:ext>
+            </a:extLst>
+          </p:cNvPr>
+          <p:cNvCxnSpPr>
+            <a:cxnSpLocks/>
+          </p:cNvCxnSpPr>
+          <p:nvPr/>
+        </p:nvCxnSpPr>
+        <p:spPr>
+          <a:xfrm>
+            <a:off x="9617637" y="6447785"/>
+            <a:ext cx="798897" cy="13462"/>
+          </a:xfrm>
+          <a:prstGeom prst="straightConnector1">
+            <a:avLst/>
+          </a:prstGeom>
+          <a:ln w="19050">
+            <a:solidFill>
+              <a:schemeClr val="accent1"/>
+            </a:solidFill>
+            <a:prstDash val="sysDash"/>
+            <a:headEnd type="arrow" w="med" len="med"/>
+            <a:tailEnd type="none" w="med" len="med"/>
+          </a:ln>
+        </p:spPr>
+        <p:style>
+          <a:lnRef idx="1">
+            <a:schemeClr val="accent1"/>
+          </a:lnRef>
+          <a:fillRef idx="0">
+            <a:schemeClr val="accent1"/>
+          </a:fillRef>
+          <a:effectRef idx="0">
+            <a:schemeClr val="accent1"/>
+          </a:effectRef>
+          <a:fontRef idx="minor">
+            <a:schemeClr val="tx1"/>
+          </a:fontRef>
+        </p:style>
       </p:cxnSp>
+      <p:cxnSp>
+        <p:nvCxnSpPr>
+          <p:cNvPr id="149" name="Straight Arrow Connector 148">
+            <a:extLst>
+              <a:ext uri="{FF2B5EF4-FFF2-40B4-BE49-F238E27FC236}">
+                <a16:creationId xmlns:a16="http://schemas.microsoft.com/office/drawing/2014/main" id="{838F6211-8620-4E54-AAFD-A0EAF8A6C2DC}"/>
+              </a:ext>
+            </a:extLst>
+          </p:cNvPr>
+          <p:cNvCxnSpPr>
+            <a:cxnSpLocks/>
+          </p:cNvCxnSpPr>
+          <p:nvPr/>
+        </p:nvCxnSpPr>
+        <p:spPr>
+          <a:xfrm>
+            <a:off x="2034287" y="6502671"/>
+            <a:ext cx="7424850" cy="0"/>
+          </a:xfrm>
+          <a:prstGeom prst="straightConnector1">
+            <a:avLst/>
+          </a:prstGeom>
+          <a:ln w="19050">
+            <a:solidFill>
+              <a:schemeClr val="accent1"/>
+            </a:solidFill>
+            <a:prstDash val="sysDash"/>
+            <a:headEnd type="arrow" w="med" len="med"/>
+            <a:tailEnd type="none" w="med" len="med"/>
+          </a:ln>
+        </p:spPr>
+        <p:style>
+          <a:lnRef idx="1">
+            <a:schemeClr val="accent1"/>
+          </a:lnRef>
+          <a:fillRef idx="0">
+            <a:schemeClr val="accent1"/>
+          </a:fillRef>
+          <a:effectRef idx="0">
+            <a:schemeClr val="accent1"/>
+          </a:effectRef>
+          <a:fontRef idx="minor">
+            <a:schemeClr val="tx1"/>
+          </a:fontRef>
+        </p:style>
+      </p:cxnSp>
+      <p:sp>
+        <p:nvSpPr>
+          <p:cNvPr id="151" name="TextBox 150">
+            <a:extLst>
+              <a:ext uri="{FF2B5EF4-FFF2-40B4-BE49-F238E27FC236}">
+                <a16:creationId xmlns:a16="http://schemas.microsoft.com/office/drawing/2014/main" id="{B36F10C7-590B-4B00-B174-596E8CB0489A}"/>
+              </a:ext>
+            </a:extLst>
+          </p:cNvPr>
+          <p:cNvSpPr txBox="1"/>
+          <p:nvPr/>
+        </p:nvSpPr>
+        <p:spPr>
+          <a:xfrm>
+            <a:off x="7634800" y="6263119"/>
+            <a:ext cx="1296605" cy="184666"/>
+          </a:xfrm>
+          <a:prstGeom prst="rect">
+            <a:avLst/>
+          </a:prstGeom>
+          <a:noFill/>
+        </p:spPr>
+        <p:txBody>
+          <a:bodyPr wrap="square" lIns="0" tIns="0" rIns="0" bIns="0" rtlCol="0">
+            <a:spAutoFit/>
+          </a:bodyPr>
+          <a:lstStyle>
+            <a:defPPr>
+              <a:defRPr lang="en-US"/>
+            </a:defPPr>
+            <a:lvl1pPr algn="r">
+              <a:defRPr sz="1400">
+                <a:solidFill>
+                  <a:srgbClr val="0070C0"/>
+                </a:solidFill>
+              </a:defRPr>
+            </a:lvl1pPr>
+          </a:lstStyle>
+          <a:p>
+            <a:r>
+              <a:rPr lang="en-US" sz="1200" dirty="0"/>
+              <a:t>result</a:t>
+            </a:r>
+          </a:p>
+        </p:txBody>
+      </p:sp>
     </p:spTree>
     <p:extLst>
       <p:ext uri="{BB962C8B-B14F-4D97-AF65-F5344CB8AC3E}">

</xml_diff>